<commit_message>
Code fixes and PPT update
</commit_message>
<xml_diff>
--- a/documentation/ZohoBooks_Connectorthon.pptx
+++ b/documentation/ZohoBooks_Connectorthon.pptx
@@ -5,38 +5,42 @@
     <p:sldMasterId id="2147483648" r:id="rId1"/>
   </p:sldMasterIdLst>
   <p:notesMasterIdLst>
-    <p:notesMasterId r:id="rId11"/>
+    <p:notesMasterId r:id="rId15"/>
   </p:notesMasterIdLst>
   <p:sldIdLst>
     <p:sldId id="366" r:id="rId2"/>
     <p:sldId id="367" r:id="rId3"/>
-    <p:sldId id="374" r:id="rId4"/>
-    <p:sldId id="369" r:id="rId5"/>
-    <p:sldId id="370" r:id="rId6"/>
-    <p:sldId id="371" r:id="rId7"/>
-    <p:sldId id="372" r:id="rId8"/>
-    <p:sldId id="373" r:id="rId9"/>
-    <p:sldId id="368" r:id="rId10"/>
+    <p:sldId id="376" r:id="rId4"/>
+    <p:sldId id="377" r:id="rId5"/>
+    <p:sldId id="375" r:id="rId6"/>
+    <p:sldId id="378" r:id="rId7"/>
+    <p:sldId id="374" r:id="rId8"/>
+    <p:sldId id="369" r:id="rId9"/>
+    <p:sldId id="370" r:id="rId10"/>
+    <p:sldId id="371" r:id="rId11"/>
+    <p:sldId id="372" r:id="rId12"/>
+    <p:sldId id="373" r:id="rId13"/>
+    <p:sldId id="368" r:id="rId14"/>
   </p:sldIdLst>
   <p:sldSz cx="12192000" cy="6858000"/>
   <p:notesSz cx="6858000" cy="9144000"/>
   <p:embeddedFontLst>
     <p:embeddedFont>
       <p:font typeface="Rubik" panose="00000500000000000000" pitchFamily="50" charset="-79"/>
-      <p:regular r:id="rId12"/>
-      <p:bold r:id="rId13"/>
-      <p:italic r:id="rId14"/>
+      <p:regular r:id="rId16"/>
+      <p:bold r:id="rId17"/>
+      <p:italic r:id="rId18"/>
     </p:embeddedFont>
     <p:embeddedFont>
       <p:font typeface="Trebuchet MS" panose="020B0603020202020204" pitchFamily="34" charset="0"/>
-      <p:regular r:id="rId15"/>
-      <p:bold r:id="rId16"/>
-      <p:italic r:id="rId17"/>
-      <p:boldItalic r:id="rId18"/>
+      <p:regular r:id="rId19"/>
+      <p:bold r:id="rId20"/>
+      <p:italic r:id="rId21"/>
+      <p:boldItalic r:id="rId22"/>
     </p:embeddedFont>
   </p:embeddedFontLst>
   <p:custDataLst>
-    <p:tags r:id="rId19"/>
+    <p:tags r:id="rId23"/>
   </p:custDataLst>
   <p:defaultTextStyle>
     <a:defPPr>
@@ -228,7 +232,7 @@
             <a:fld id="{CFA44459-8680-4AD3-8D18-9EF0845F156E}" type="datetimeFigureOut">
               <a:rPr lang="en-US"/>
               <a:pPr/>
-              <a:t>1/28/2022</a:t>
+              <a:t>1/29/2022</a:t>
             </a:fld>
             <a:endParaRPr lang="en-US" dirty="0"/>
           </a:p>
@@ -736,7 +740,7 @@
             <a:fld id="{83316E30-EEB7-4740-B0AB-5BFB7F8E5764}" type="slidenum">
               <a:rPr lang="en-US"/>
               <a:pPr/>
-              <a:t>9</a:t>
+              <a:t>13</a:t>
             </a:fld>
             <a:endParaRPr lang="en-US" dirty="0"/>
           </a:p>
@@ -1419,7 +1423,7 @@
             <a:fld id="{748832CA-DCD2-41B3-96D1-6E92E8FA8B22}" type="datetime1">
               <a:rPr lang="en-US"/>
               <a:pPr/>
-              <a:t>1/28/2022</a:t>
+              <a:t>1/29/2022</a:t>
             </a:fld>
             <a:endParaRPr lang="en-US" dirty="0"/>
           </a:p>
@@ -3419,7 +3423,7 @@
             <a:fld id="{91D32E29-F823-4652-9AE9-2D2F132296DA}" type="datetime1">
               <a:rPr lang="en-US"/>
               <a:pPr/>
-              <a:t>1/28/2022</a:t>
+              <a:t>1/29/2022</a:t>
             </a:fld>
             <a:endParaRPr lang="en-US" dirty="0"/>
           </a:p>
@@ -4433,7 +4437,7 @@
             <a:fld id="{04A728B0-2EE8-4602-849F-D2D469FDAEE2}" type="datetime1">
               <a:rPr lang="en-US"/>
               <a:pPr/>
-              <a:t>1/28/2022</a:t>
+              <a:t>1/29/2022</a:t>
             </a:fld>
             <a:endParaRPr lang="en-US" dirty="0"/>
           </a:p>
@@ -4703,7 +4707,7 @@
             <a:fld id="{04A728B0-2EE8-4602-849F-D2D469FDAEE2}" type="datetime1">
               <a:rPr lang="en-US"/>
               <a:pPr/>
-              <a:t>1/28/2022</a:t>
+              <a:t>1/29/2022</a:t>
             </a:fld>
             <a:endParaRPr lang="en-US" dirty="0"/>
           </a:p>
@@ -7413,7 +7417,7 @@
             <a:fld id="{04A728B0-2EE8-4602-849F-D2D469FDAEE2}" type="datetime1">
               <a:rPr lang="en-US"/>
               <a:pPr/>
-              <a:t>1/28/2022</a:t>
+              <a:t>1/29/2022</a:t>
             </a:fld>
             <a:endParaRPr lang="en-US" dirty="0"/>
           </a:p>
@@ -10116,7 +10120,7 @@
             <a:fld id="{04A728B0-2EE8-4602-849F-D2D469FDAEE2}" type="datetime1">
               <a:rPr lang="en-US"/>
               <a:pPr/>
-              <a:t>1/28/2022</a:t>
+              <a:t>1/29/2022</a:t>
             </a:fld>
             <a:endParaRPr lang="en-US" dirty="0"/>
           </a:p>
@@ -12581,7 +12585,7 @@
             <a:fld id="{04A728B0-2EE8-4602-849F-D2D469FDAEE2}" type="datetime1">
               <a:rPr lang="en-US"/>
               <a:pPr/>
-              <a:t>1/28/2022</a:t>
+              <a:t>1/29/2022</a:t>
             </a:fld>
             <a:endParaRPr lang="en-US" dirty="0"/>
           </a:p>
@@ -15262,7 +15266,7 @@
             <a:fld id="{E4BC88E4-0D26-41E6-8DE3-67CA588048C0}" type="datetime1">
               <a:rPr lang="en-US"/>
               <a:pPr/>
-              <a:t>1/28/2022</a:t>
+              <a:t>1/29/2022</a:t>
             </a:fld>
             <a:endParaRPr lang="en-US" dirty="0"/>
           </a:p>
@@ -17217,7 +17221,7 @@
             <a:fld id="{A9585ADC-08B8-45FD-80FE-46AC3DB310D7}" type="datetime1">
               <a:rPr lang="en-US"/>
               <a:pPr/>
-              <a:t>1/28/2022</a:t>
+              <a:t>1/29/2022</a:t>
             </a:fld>
             <a:endParaRPr lang="en-US" dirty="0"/>
           </a:p>
@@ -19606,7 +19610,7 @@
           <a:p>
             <a:fld id="{6DEDDF15-459B-4C18-9AB7-2CFC650F197B}" type="datetime1">
               <a:rPr lang="en-US"/>
-              <a:t>1/28/2022</a:t>
+              <a:t>1/29/2022</a:t>
             </a:fld>
             <a:endParaRPr lang="en-US" dirty="0"/>
           </a:p>
@@ -21439,7 +21443,7 @@
             <a:fld id="{04A728B0-2EE8-4602-849F-D2D469FDAEE2}" type="datetime1">
               <a:rPr lang="en-US"/>
               <a:pPr/>
-              <a:t>1/28/2022</a:t>
+              <a:t>1/29/2022</a:t>
             </a:fld>
             <a:endParaRPr lang="en-US" dirty="0"/>
           </a:p>
@@ -21900,7 +21904,7 @@
             <a:fld id="{04A728B0-2EE8-4602-849F-D2D469FDAEE2}" type="datetime1">
               <a:rPr lang="en-US"/>
               <a:pPr/>
-              <a:t>1/28/2022</a:t>
+              <a:t>1/29/2022</a:t>
             </a:fld>
             <a:endParaRPr lang="en-US" dirty="0"/>
           </a:p>
@@ -22221,7 +22225,7 @@
             <a:fld id="{91D32E29-F823-4652-9AE9-2D2F132296DA}" type="datetime1">
               <a:rPr lang="en-US"/>
               <a:pPr/>
-              <a:t>1/28/2022</a:t>
+              <a:t>1/29/2022</a:t>
             </a:fld>
             <a:endParaRPr lang="en-US" dirty="0"/>
           </a:p>
@@ -22803,7 +22807,7 @@
           <a:p>
             <a:fld id="{04A728B0-2EE8-4602-849F-D2D469FDAEE2}" type="datetime1">
               <a:rPr lang="en-US"/>
-              <a:t>1/28/2022</a:t>
+              <a:t>1/29/2022</a:t>
             </a:fld>
             <a:endParaRPr lang="en-US" dirty="0"/>
           </a:p>
@@ -23608,7 +23612,7 @@
             <a:fld id="{04A728B0-2EE8-4602-849F-D2D469FDAEE2}" type="datetime1">
               <a:rPr lang="en-US"/>
               <a:pPr/>
-              <a:t>1/28/2022</a:t>
+              <a:t>1/29/2022</a:t>
             </a:fld>
             <a:endParaRPr lang="en-US" dirty="0"/>
           </a:p>
@@ -24465,7 +24469,7 @@
             <a:fld id="{91D32E29-F823-4652-9AE9-2D2F132296DA}" type="datetime1">
               <a:rPr lang="en-US"/>
               <a:pPr/>
-              <a:t>1/28/2022</a:t>
+              <a:t>1/29/2022</a:t>
             </a:fld>
             <a:endParaRPr lang="en-US" dirty="0"/>
           </a:p>
@@ -25380,7 +25384,7 @@
             <a:fld id="{91D32E29-F823-4652-9AE9-2D2F132296DA}" type="datetime1">
               <a:rPr lang="en-US"/>
               <a:pPr/>
-              <a:t>1/28/2022</a:t>
+              <a:t>1/29/2022</a:t>
             </a:fld>
             <a:endParaRPr lang="en-US" dirty="0"/>
           </a:p>
@@ -26251,7 +26255,7 @@
             <a:fld id="{04A728B0-2EE8-4602-849F-D2D469FDAEE2}" type="datetime1">
               <a:rPr lang="en-US"/>
               <a:pPr/>
-              <a:t>1/28/2022</a:t>
+              <a:t>1/29/2022</a:t>
             </a:fld>
             <a:endParaRPr lang="en-US" dirty="0"/>
           </a:p>
@@ -33627,7 +33631,7 @@
           </a:p>
           <a:p>
             <a:r>
-              <a:rPr lang="en-US" dirty="0"/>
+              <a:rPr lang="en-US" sz="1200" b="1" dirty="0"/>
               <a:t>Vageesh Shadakshari</a:t>
             </a:r>
           </a:p>
@@ -33708,10 +33712,1033 @@
           </a:p>
         </p:txBody>
       </p:sp>
+      <p:pic>
+        <p:nvPicPr>
+          <p:cNvPr id="8" name="Picture 7" descr="Logo, company name&#10;&#10;Description automatically generated">
+            <a:extLst>
+              <a:ext uri="{FF2B5EF4-FFF2-40B4-BE49-F238E27FC236}">
+                <a16:creationId xmlns:a16="http://schemas.microsoft.com/office/drawing/2014/main" id="{1EE845F7-3FE6-422A-A16B-2E102E378AF1}"/>
+              </a:ext>
+            </a:extLst>
+          </p:cNvPr>
+          <p:cNvPicPr>
+            <a:picLocks noChangeAspect="1"/>
+          </p:cNvPicPr>
+          <p:nvPr/>
+        </p:nvPicPr>
+        <p:blipFill>
+          <a:blip r:embed="rId3">
+            <a:extLst>
+              <a:ext uri="{28A0092B-C50C-407E-A947-70E740481C1C}">
+                <a14:useLocalDpi xmlns:a14="http://schemas.microsoft.com/office/drawing/2010/main" val="0"/>
+              </a:ext>
+            </a:extLst>
+          </a:blip>
+          <a:stretch>
+            <a:fillRect/>
+          </a:stretch>
+        </p:blipFill>
+        <p:spPr>
+          <a:xfrm>
+            <a:off x="858553" y="759496"/>
+            <a:ext cx="1756383" cy="1756383"/>
+          </a:xfrm>
+          <a:prstGeom prst="rect">
+            <a:avLst/>
+          </a:prstGeom>
+        </p:spPr>
+      </p:pic>
     </p:spTree>
     <p:extLst>
       <p:ext uri="{BB962C8B-B14F-4D97-AF65-F5344CB8AC3E}">
         <p14:creationId xmlns:p14="http://schemas.microsoft.com/office/powerpoint/2010/main" val="684571084"/>
+      </p:ext>
+    </p:extLst>
+  </p:cSld>
+  <p:clrMapOvr>
+    <a:masterClrMapping/>
+  </p:clrMapOvr>
+</p:sld>
+</file>
+
+<file path=ppt/slides/slide10.xml><?xml version="1.0" encoding="utf-8"?>
+<p:sld xmlns:a="http://schemas.openxmlformats.org/drawingml/2006/main" xmlns:r="http://schemas.openxmlformats.org/officeDocument/2006/relationships" xmlns:p="http://schemas.openxmlformats.org/presentationml/2006/main">
+  <p:cSld>
+    <p:spTree>
+      <p:nvGrpSpPr>
+        <p:cNvPr id="1" name=""/>
+        <p:cNvGrpSpPr/>
+        <p:nvPr/>
+      </p:nvGrpSpPr>
+      <p:grpSpPr>
+        <a:xfrm>
+          <a:off x="0" y="0"/>
+          <a:ext cx="0" cy="0"/>
+          <a:chOff x="0" y="0"/>
+          <a:chExt cx="0" cy="0"/>
+        </a:xfrm>
+      </p:grpSpPr>
+      <p:sp>
+        <p:nvSpPr>
+          <p:cNvPr id="2" name="Footer Placeholder 1">
+            <a:extLst>
+              <a:ext uri="{FF2B5EF4-FFF2-40B4-BE49-F238E27FC236}">
+                <a16:creationId xmlns:a16="http://schemas.microsoft.com/office/drawing/2014/main" id="{1D086587-FFCE-405F-BDA1-ADE1411A94F0}"/>
+              </a:ext>
+            </a:extLst>
+          </p:cNvPr>
+          <p:cNvSpPr>
+            <a:spLocks noGrp="1"/>
+          </p:cNvSpPr>
+          <p:nvPr>
+            <p:ph type="ftr" sz="quarter" idx="3"/>
+          </p:nvPr>
+        </p:nvSpPr>
+        <p:spPr/>
+        <p:txBody>
+          <a:bodyPr/>
+          <a:lstStyle/>
+          <a:p>
+            <a:r>
+              <a:rPr lang="en-US"/>
+              <a:t>© 2021 Software AG. All rights reserved. For internal use only and for Software AG Partners.</a:t>
+            </a:r>
+            <a:endParaRPr lang="en-US" dirty="0"/>
+          </a:p>
+        </p:txBody>
+      </p:sp>
+      <p:sp>
+        <p:nvSpPr>
+          <p:cNvPr id="3" name="Slide Number Placeholder 2">
+            <a:extLst>
+              <a:ext uri="{FF2B5EF4-FFF2-40B4-BE49-F238E27FC236}">
+                <a16:creationId xmlns:a16="http://schemas.microsoft.com/office/drawing/2014/main" id="{DFB1FAC4-6E35-40F6-BCDE-674A7CBD420A}"/>
+              </a:ext>
+            </a:extLst>
+          </p:cNvPr>
+          <p:cNvSpPr>
+            <a:spLocks noGrp="1"/>
+          </p:cNvSpPr>
+          <p:nvPr>
+            <p:ph type="sldNum" sz="quarter" idx="4"/>
+          </p:nvPr>
+        </p:nvSpPr>
+        <p:spPr/>
+        <p:txBody>
+          <a:bodyPr/>
+          <a:lstStyle/>
+          <a:p>
+            <a:fld id="{22FF84AA-2C76-4AF1-8502-73D25D47F37C}" type="slidenum">
+              <a:rPr lang="en-US" smtClean="0"/>
+              <a:pPr/>
+              <a:t>10</a:t>
+            </a:fld>
+            <a:endParaRPr lang="en-US" dirty="0"/>
+          </a:p>
+        </p:txBody>
+      </p:sp>
+      <p:sp>
+        <p:nvSpPr>
+          <p:cNvPr id="4" name="Title 3">
+            <a:extLst>
+              <a:ext uri="{FF2B5EF4-FFF2-40B4-BE49-F238E27FC236}">
+                <a16:creationId xmlns:a16="http://schemas.microsoft.com/office/drawing/2014/main" id="{C8E5B66F-5A0C-4C10-A242-AC941064039C}"/>
+              </a:ext>
+            </a:extLst>
+          </p:cNvPr>
+          <p:cNvSpPr>
+            <a:spLocks noGrp="1"/>
+          </p:cNvSpPr>
+          <p:nvPr>
+            <p:ph type="title"/>
+          </p:nvPr>
+        </p:nvSpPr>
+        <p:spPr/>
+        <p:txBody>
+          <a:bodyPr/>
+          <a:lstStyle/>
+          <a:p>
+            <a:r>
+              <a:rPr lang="en-US" dirty="0"/>
+              <a:t>Create Invoice</a:t>
+            </a:r>
+            <a:endParaRPr lang="en-IN" dirty="0"/>
+          </a:p>
+        </p:txBody>
+      </p:sp>
+      <p:sp>
+        <p:nvSpPr>
+          <p:cNvPr id="5" name="Subtitle 4">
+            <a:extLst>
+              <a:ext uri="{FF2B5EF4-FFF2-40B4-BE49-F238E27FC236}">
+                <a16:creationId xmlns:a16="http://schemas.microsoft.com/office/drawing/2014/main" id="{4F442423-B1E1-4750-89BA-CCF925BA4ADA}"/>
+              </a:ext>
+            </a:extLst>
+          </p:cNvPr>
+          <p:cNvSpPr>
+            <a:spLocks noGrp="1"/>
+          </p:cNvSpPr>
+          <p:nvPr>
+            <p:ph type="subTitle" sz="quarter" idx="1"/>
+          </p:nvPr>
+        </p:nvSpPr>
+        <p:spPr/>
+        <p:txBody>
+          <a:bodyPr/>
+          <a:lstStyle/>
+          <a:p>
+            <a:r>
+              <a:rPr lang="en-US" dirty="0"/>
+              <a:t>Flow and Input</a:t>
+            </a:r>
+            <a:endParaRPr lang="en-IN" dirty="0"/>
+          </a:p>
+        </p:txBody>
+      </p:sp>
+      <p:sp>
+        <p:nvSpPr>
+          <p:cNvPr id="6" name="Text Placeholder 5">
+            <a:extLst>
+              <a:ext uri="{FF2B5EF4-FFF2-40B4-BE49-F238E27FC236}">
+                <a16:creationId xmlns:a16="http://schemas.microsoft.com/office/drawing/2014/main" id="{7149F0F6-3E4C-43AA-8AAC-028DFE50D036}"/>
+              </a:ext>
+            </a:extLst>
+          </p:cNvPr>
+          <p:cNvSpPr>
+            <a:spLocks noGrp="1"/>
+          </p:cNvSpPr>
+          <p:nvPr>
+            <p:ph type="body" sz="quarter" idx="11"/>
+          </p:nvPr>
+        </p:nvSpPr>
+        <p:spPr/>
+        <p:txBody>
+          <a:bodyPr/>
+          <a:lstStyle/>
+          <a:p>
+            <a:endParaRPr lang="en-IN"/>
+          </a:p>
+        </p:txBody>
+      </p:sp>
+      <p:sp>
+        <p:nvSpPr>
+          <p:cNvPr id="7" name="Text Placeholder 6">
+            <a:extLst>
+              <a:ext uri="{FF2B5EF4-FFF2-40B4-BE49-F238E27FC236}">
+                <a16:creationId xmlns:a16="http://schemas.microsoft.com/office/drawing/2014/main" id="{B5A43AC2-F730-42CF-AE9D-FDE3909189B2}"/>
+              </a:ext>
+            </a:extLst>
+          </p:cNvPr>
+          <p:cNvSpPr>
+            <a:spLocks noGrp="1"/>
+          </p:cNvSpPr>
+          <p:nvPr>
+            <p:ph type="body" sz="quarter" idx="12"/>
+          </p:nvPr>
+        </p:nvSpPr>
+        <p:spPr/>
+        <p:txBody>
+          <a:bodyPr/>
+          <a:lstStyle/>
+          <a:p>
+            <a:endParaRPr lang="en-IN"/>
+          </a:p>
+        </p:txBody>
+      </p:sp>
+      <p:pic>
+        <p:nvPicPr>
+          <p:cNvPr id="11" name="Content Placeholder 10">
+            <a:extLst>
+              <a:ext uri="{FF2B5EF4-FFF2-40B4-BE49-F238E27FC236}">
+                <a16:creationId xmlns:a16="http://schemas.microsoft.com/office/drawing/2014/main" id="{396A9174-8E4F-4118-A1AB-DFBE35F6206E}"/>
+              </a:ext>
+            </a:extLst>
+          </p:cNvPr>
+          <p:cNvPicPr>
+            <a:picLocks noGrp="1" noChangeAspect="1"/>
+          </p:cNvPicPr>
+          <p:nvPr>
+            <p:ph sz="quarter" idx="21"/>
+          </p:nvPr>
+        </p:nvPicPr>
+        <p:blipFill>
+          <a:blip r:embed="rId2"/>
+          <a:stretch>
+            <a:fillRect/>
+          </a:stretch>
+        </p:blipFill>
+        <p:spPr>
+          <a:xfrm>
+            <a:off x="282240" y="1371921"/>
+            <a:ext cx="5795132" cy="3265661"/>
+          </a:xfrm>
+        </p:spPr>
+      </p:pic>
+      <p:sp>
+        <p:nvSpPr>
+          <p:cNvPr id="9" name="Content Placeholder 8">
+            <a:extLst>
+              <a:ext uri="{FF2B5EF4-FFF2-40B4-BE49-F238E27FC236}">
+                <a16:creationId xmlns:a16="http://schemas.microsoft.com/office/drawing/2014/main" id="{432F783C-FF7F-4360-B358-81B58FBD3B20}"/>
+              </a:ext>
+            </a:extLst>
+          </p:cNvPr>
+          <p:cNvSpPr>
+            <a:spLocks noGrp="1"/>
+          </p:cNvSpPr>
+          <p:nvPr>
+            <p:ph sz="quarter" idx="22"/>
+          </p:nvPr>
+        </p:nvSpPr>
+        <p:spPr/>
+        <p:txBody>
+          <a:bodyPr/>
+          <a:lstStyle/>
+          <a:p>
+            <a:endParaRPr lang="en-IN"/>
+          </a:p>
+        </p:txBody>
+      </p:sp>
+      <p:pic>
+        <p:nvPicPr>
+          <p:cNvPr id="13" name="Picture 12">
+            <a:extLst>
+              <a:ext uri="{FF2B5EF4-FFF2-40B4-BE49-F238E27FC236}">
+                <a16:creationId xmlns:a16="http://schemas.microsoft.com/office/drawing/2014/main" id="{061D8C08-AAFE-4DF0-9F15-BEBDAB618AA6}"/>
+              </a:ext>
+            </a:extLst>
+          </p:cNvPr>
+          <p:cNvPicPr>
+            <a:picLocks noChangeAspect="1"/>
+          </p:cNvPicPr>
+          <p:nvPr/>
+        </p:nvPicPr>
+        <p:blipFill>
+          <a:blip r:embed="rId3"/>
+          <a:stretch>
+            <a:fillRect/>
+          </a:stretch>
+        </p:blipFill>
+        <p:spPr>
+          <a:xfrm>
+            <a:off x="6193200" y="1358613"/>
+            <a:ext cx="5637213" cy="3174354"/>
+          </a:xfrm>
+          <a:prstGeom prst="rect">
+            <a:avLst/>
+          </a:prstGeom>
+        </p:spPr>
+      </p:pic>
+    </p:spTree>
+    <p:extLst>
+      <p:ext uri="{BB962C8B-B14F-4D97-AF65-F5344CB8AC3E}">
+        <p14:creationId xmlns:p14="http://schemas.microsoft.com/office/powerpoint/2010/main" val="1569880048"/>
+      </p:ext>
+    </p:extLst>
+  </p:cSld>
+  <p:clrMapOvr>
+    <a:masterClrMapping/>
+  </p:clrMapOvr>
+</p:sld>
+</file>
+
+<file path=ppt/slides/slide11.xml><?xml version="1.0" encoding="utf-8"?>
+<p:sld xmlns:a="http://schemas.openxmlformats.org/drawingml/2006/main" xmlns:r="http://schemas.openxmlformats.org/officeDocument/2006/relationships" xmlns:p="http://schemas.openxmlformats.org/presentationml/2006/main">
+  <p:cSld>
+    <p:spTree>
+      <p:nvGrpSpPr>
+        <p:cNvPr id="1" name=""/>
+        <p:cNvGrpSpPr/>
+        <p:nvPr/>
+      </p:nvGrpSpPr>
+      <p:grpSpPr>
+        <a:xfrm>
+          <a:off x="0" y="0"/>
+          <a:ext cx="0" cy="0"/>
+          <a:chOff x="0" y="0"/>
+          <a:chExt cx="0" cy="0"/>
+        </a:xfrm>
+      </p:grpSpPr>
+      <p:sp>
+        <p:nvSpPr>
+          <p:cNvPr id="2" name="Footer Placeholder 1">
+            <a:extLst>
+              <a:ext uri="{FF2B5EF4-FFF2-40B4-BE49-F238E27FC236}">
+                <a16:creationId xmlns:a16="http://schemas.microsoft.com/office/drawing/2014/main" id="{C85C66DA-D497-4B35-8AA5-EE62928014BD}"/>
+              </a:ext>
+            </a:extLst>
+          </p:cNvPr>
+          <p:cNvSpPr>
+            <a:spLocks noGrp="1"/>
+          </p:cNvSpPr>
+          <p:nvPr>
+            <p:ph type="ftr" sz="quarter" idx="3"/>
+          </p:nvPr>
+        </p:nvSpPr>
+        <p:spPr/>
+        <p:txBody>
+          <a:bodyPr/>
+          <a:lstStyle/>
+          <a:p>
+            <a:r>
+              <a:rPr lang="en-US"/>
+              <a:t>© 2021 Software AG. All rights reserved. For internal use only and for Software AG Partners.</a:t>
+            </a:r>
+            <a:endParaRPr lang="en-US" dirty="0"/>
+          </a:p>
+        </p:txBody>
+      </p:sp>
+      <p:sp>
+        <p:nvSpPr>
+          <p:cNvPr id="3" name="Slide Number Placeholder 2">
+            <a:extLst>
+              <a:ext uri="{FF2B5EF4-FFF2-40B4-BE49-F238E27FC236}">
+                <a16:creationId xmlns:a16="http://schemas.microsoft.com/office/drawing/2014/main" id="{03E796A8-5AF6-4D13-91CD-89A8EC1F5142}"/>
+              </a:ext>
+            </a:extLst>
+          </p:cNvPr>
+          <p:cNvSpPr>
+            <a:spLocks noGrp="1"/>
+          </p:cNvSpPr>
+          <p:nvPr>
+            <p:ph type="sldNum" sz="quarter" idx="4"/>
+          </p:nvPr>
+        </p:nvSpPr>
+        <p:spPr/>
+        <p:txBody>
+          <a:bodyPr/>
+          <a:lstStyle/>
+          <a:p>
+            <a:fld id="{22FF84AA-2C76-4AF1-8502-73D25D47F37C}" type="slidenum">
+              <a:rPr lang="en-US" smtClean="0"/>
+              <a:pPr/>
+              <a:t>11</a:t>
+            </a:fld>
+            <a:endParaRPr lang="en-US" dirty="0"/>
+          </a:p>
+        </p:txBody>
+      </p:sp>
+      <p:sp>
+        <p:nvSpPr>
+          <p:cNvPr id="4" name="Title 3">
+            <a:extLst>
+              <a:ext uri="{FF2B5EF4-FFF2-40B4-BE49-F238E27FC236}">
+                <a16:creationId xmlns:a16="http://schemas.microsoft.com/office/drawing/2014/main" id="{45B32D6E-4A34-4256-A03D-95B85239C376}"/>
+              </a:ext>
+            </a:extLst>
+          </p:cNvPr>
+          <p:cNvSpPr>
+            <a:spLocks noGrp="1"/>
+          </p:cNvSpPr>
+          <p:nvPr>
+            <p:ph type="title"/>
+          </p:nvPr>
+        </p:nvSpPr>
+        <p:spPr/>
+        <p:txBody>
+          <a:bodyPr/>
+          <a:lstStyle/>
+          <a:p>
+            <a:r>
+              <a:rPr lang="en-US" dirty="0"/>
+              <a:t>Update Invoice</a:t>
+            </a:r>
+            <a:endParaRPr lang="en-IN" dirty="0"/>
+          </a:p>
+        </p:txBody>
+      </p:sp>
+      <p:sp>
+        <p:nvSpPr>
+          <p:cNvPr id="5" name="Subtitle 4">
+            <a:extLst>
+              <a:ext uri="{FF2B5EF4-FFF2-40B4-BE49-F238E27FC236}">
+                <a16:creationId xmlns:a16="http://schemas.microsoft.com/office/drawing/2014/main" id="{76B78CC1-62C3-45BE-8A6A-A660399ADB03}"/>
+              </a:ext>
+            </a:extLst>
+          </p:cNvPr>
+          <p:cNvSpPr>
+            <a:spLocks noGrp="1"/>
+          </p:cNvSpPr>
+          <p:nvPr>
+            <p:ph type="subTitle" sz="quarter" idx="1"/>
+          </p:nvPr>
+        </p:nvSpPr>
+        <p:spPr/>
+        <p:txBody>
+          <a:bodyPr/>
+          <a:lstStyle/>
+          <a:p>
+            <a:r>
+              <a:rPr lang="en-US" dirty="0"/>
+              <a:t>Input pipeline and output</a:t>
+            </a:r>
+            <a:endParaRPr lang="en-IN" dirty="0"/>
+          </a:p>
+        </p:txBody>
+      </p:sp>
+      <p:sp>
+        <p:nvSpPr>
+          <p:cNvPr id="6" name="Text Placeholder 5">
+            <a:extLst>
+              <a:ext uri="{FF2B5EF4-FFF2-40B4-BE49-F238E27FC236}">
+                <a16:creationId xmlns:a16="http://schemas.microsoft.com/office/drawing/2014/main" id="{425763C2-FFB9-41FA-B848-0818DE275CB3}"/>
+              </a:ext>
+            </a:extLst>
+          </p:cNvPr>
+          <p:cNvSpPr>
+            <a:spLocks noGrp="1"/>
+          </p:cNvSpPr>
+          <p:nvPr>
+            <p:ph type="body" sz="quarter" idx="11"/>
+          </p:nvPr>
+        </p:nvSpPr>
+        <p:spPr/>
+        <p:txBody>
+          <a:bodyPr/>
+          <a:lstStyle/>
+          <a:p>
+            <a:endParaRPr lang="en-IN"/>
+          </a:p>
+        </p:txBody>
+      </p:sp>
+      <p:sp>
+        <p:nvSpPr>
+          <p:cNvPr id="7" name="Text Placeholder 6">
+            <a:extLst>
+              <a:ext uri="{FF2B5EF4-FFF2-40B4-BE49-F238E27FC236}">
+                <a16:creationId xmlns:a16="http://schemas.microsoft.com/office/drawing/2014/main" id="{D6F442F8-4C72-4AA7-A271-DEF3FD8D5054}"/>
+              </a:ext>
+            </a:extLst>
+          </p:cNvPr>
+          <p:cNvSpPr>
+            <a:spLocks noGrp="1"/>
+          </p:cNvSpPr>
+          <p:nvPr>
+            <p:ph type="body" sz="quarter" idx="12"/>
+          </p:nvPr>
+        </p:nvSpPr>
+        <p:spPr/>
+        <p:txBody>
+          <a:bodyPr/>
+          <a:lstStyle/>
+          <a:p>
+            <a:endParaRPr lang="en-IN" dirty="0"/>
+          </a:p>
+        </p:txBody>
+      </p:sp>
+      <p:sp>
+        <p:nvSpPr>
+          <p:cNvPr id="8" name="Content Placeholder 7">
+            <a:extLst>
+              <a:ext uri="{FF2B5EF4-FFF2-40B4-BE49-F238E27FC236}">
+                <a16:creationId xmlns:a16="http://schemas.microsoft.com/office/drawing/2014/main" id="{6823FC9E-C3B4-4D87-B443-9B357C22CD8D}"/>
+              </a:ext>
+            </a:extLst>
+          </p:cNvPr>
+          <p:cNvSpPr>
+            <a:spLocks noGrp="1"/>
+          </p:cNvSpPr>
+          <p:nvPr>
+            <p:ph sz="quarter" idx="21"/>
+          </p:nvPr>
+        </p:nvSpPr>
+        <p:spPr/>
+        <p:txBody>
+          <a:bodyPr/>
+          <a:lstStyle/>
+          <a:p>
+            <a:endParaRPr lang="en-IN"/>
+          </a:p>
+        </p:txBody>
+      </p:sp>
+      <p:sp>
+        <p:nvSpPr>
+          <p:cNvPr id="9" name="Content Placeholder 8">
+            <a:extLst>
+              <a:ext uri="{FF2B5EF4-FFF2-40B4-BE49-F238E27FC236}">
+                <a16:creationId xmlns:a16="http://schemas.microsoft.com/office/drawing/2014/main" id="{24A9B38E-71D1-47BD-B50D-465B7EACD5FA}"/>
+              </a:ext>
+            </a:extLst>
+          </p:cNvPr>
+          <p:cNvSpPr>
+            <a:spLocks noGrp="1"/>
+          </p:cNvSpPr>
+          <p:nvPr>
+            <p:ph sz="quarter" idx="22"/>
+          </p:nvPr>
+        </p:nvSpPr>
+        <p:spPr/>
+        <p:txBody>
+          <a:bodyPr/>
+          <a:lstStyle/>
+          <a:p>
+            <a:endParaRPr lang="en-IN"/>
+          </a:p>
+        </p:txBody>
+      </p:sp>
+      <p:pic>
+        <p:nvPicPr>
+          <p:cNvPr id="11" name="Picture 10">
+            <a:extLst>
+              <a:ext uri="{FF2B5EF4-FFF2-40B4-BE49-F238E27FC236}">
+                <a16:creationId xmlns:a16="http://schemas.microsoft.com/office/drawing/2014/main" id="{BE146A15-97AC-43BE-AF54-8033BFCCE8E2}"/>
+              </a:ext>
+            </a:extLst>
+          </p:cNvPr>
+          <p:cNvPicPr>
+            <a:picLocks noChangeAspect="1"/>
+          </p:cNvPicPr>
+          <p:nvPr/>
+        </p:nvPicPr>
+        <p:blipFill>
+          <a:blip r:embed="rId2"/>
+          <a:stretch>
+            <a:fillRect/>
+          </a:stretch>
+        </p:blipFill>
+        <p:spPr>
+          <a:xfrm>
+            <a:off x="6193200" y="1129330"/>
+            <a:ext cx="5735811" cy="3077752"/>
+          </a:xfrm>
+          <a:prstGeom prst="rect">
+            <a:avLst/>
+          </a:prstGeom>
+        </p:spPr>
+      </p:pic>
+      <p:pic>
+        <p:nvPicPr>
+          <p:cNvPr id="15" name="Picture 14">
+            <a:extLst>
+              <a:ext uri="{FF2B5EF4-FFF2-40B4-BE49-F238E27FC236}">
+                <a16:creationId xmlns:a16="http://schemas.microsoft.com/office/drawing/2014/main" id="{3273CC32-1FDA-4C54-9DDF-FDF8C4368051}"/>
+              </a:ext>
+            </a:extLst>
+          </p:cNvPr>
+          <p:cNvPicPr>
+            <a:picLocks noChangeAspect="1"/>
+          </p:cNvPicPr>
+          <p:nvPr/>
+        </p:nvPicPr>
+        <p:blipFill>
+          <a:blip r:embed="rId3"/>
+          <a:stretch>
+            <a:fillRect/>
+          </a:stretch>
+        </p:blipFill>
+        <p:spPr>
+          <a:xfrm>
+            <a:off x="505700" y="2378515"/>
+            <a:ext cx="5542012" cy="733502"/>
+          </a:xfrm>
+          <a:prstGeom prst="rect">
+            <a:avLst/>
+          </a:prstGeom>
+        </p:spPr>
+      </p:pic>
+    </p:spTree>
+    <p:extLst>
+      <p:ext uri="{BB962C8B-B14F-4D97-AF65-F5344CB8AC3E}">
+        <p14:creationId xmlns:p14="http://schemas.microsoft.com/office/powerpoint/2010/main" val="847056297"/>
+      </p:ext>
+    </p:extLst>
+  </p:cSld>
+  <p:clrMapOvr>
+    <a:masterClrMapping/>
+  </p:clrMapOvr>
+</p:sld>
+</file>
+
+<file path=ppt/slides/slide12.xml><?xml version="1.0" encoding="utf-8"?>
+<p:sld xmlns:a="http://schemas.openxmlformats.org/drawingml/2006/main" xmlns:r="http://schemas.openxmlformats.org/officeDocument/2006/relationships" xmlns:p="http://schemas.openxmlformats.org/presentationml/2006/main">
+  <p:cSld>
+    <p:spTree>
+      <p:nvGrpSpPr>
+        <p:cNvPr id="1" name=""/>
+        <p:cNvGrpSpPr/>
+        <p:nvPr/>
+      </p:nvGrpSpPr>
+      <p:grpSpPr>
+        <a:xfrm>
+          <a:off x="0" y="0"/>
+          <a:ext cx="0" cy="0"/>
+          <a:chOff x="0" y="0"/>
+          <a:chExt cx="0" cy="0"/>
+        </a:xfrm>
+      </p:grpSpPr>
+      <p:sp>
+        <p:nvSpPr>
+          <p:cNvPr id="2" name="Footer Placeholder 1">
+            <a:extLst>
+              <a:ext uri="{FF2B5EF4-FFF2-40B4-BE49-F238E27FC236}">
+                <a16:creationId xmlns:a16="http://schemas.microsoft.com/office/drawing/2014/main" id="{34E94CBD-179C-4B63-A651-8A502FA9D87C}"/>
+              </a:ext>
+            </a:extLst>
+          </p:cNvPr>
+          <p:cNvSpPr>
+            <a:spLocks noGrp="1"/>
+          </p:cNvSpPr>
+          <p:nvPr>
+            <p:ph type="ftr" sz="quarter" idx="3"/>
+          </p:nvPr>
+        </p:nvSpPr>
+        <p:spPr/>
+        <p:txBody>
+          <a:bodyPr/>
+          <a:lstStyle/>
+          <a:p>
+            <a:r>
+              <a:rPr lang="en-US"/>
+              <a:t>© 2021 Software AG. All rights reserved. For internal use only and for Software AG Partners.</a:t>
+            </a:r>
+            <a:endParaRPr lang="en-US" dirty="0"/>
+          </a:p>
+        </p:txBody>
+      </p:sp>
+      <p:sp>
+        <p:nvSpPr>
+          <p:cNvPr id="3" name="Slide Number Placeholder 2">
+            <a:extLst>
+              <a:ext uri="{FF2B5EF4-FFF2-40B4-BE49-F238E27FC236}">
+                <a16:creationId xmlns:a16="http://schemas.microsoft.com/office/drawing/2014/main" id="{6D51A362-C750-4486-A87A-2F397DC206A0}"/>
+              </a:ext>
+            </a:extLst>
+          </p:cNvPr>
+          <p:cNvSpPr>
+            <a:spLocks noGrp="1"/>
+          </p:cNvSpPr>
+          <p:nvPr>
+            <p:ph type="sldNum" sz="quarter" idx="4"/>
+          </p:nvPr>
+        </p:nvSpPr>
+        <p:spPr/>
+        <p:txBody>
+          <a:bodyPr/>
+          <a:lstStyle/>
+          <a:p>
+            <a:fld id="{22FF84AA-2C76-4AF1-8502-73D25D47F37C}" type="slidenum">
+              <a:rPr lang="en-US" smtClean="0"/>
+              <a:pPr/>
+              <a:t>12</a:t>
+            </a:fld>
+            <a:endParaRPr lang="en-US" dirty="0"/>
+          </a:p>
+        </p:txBody>
+      </p:sp>
+      <p:sp>
+        <p:nvSpPr>
+          <p:cNvPr id="4" name="Title 3">
+            <a:extLst>
+              <a:ext uri="{FF2B5EF4-FFF2-40B4-BE49-F238E27FC236}">
+                <a16:creationId xmlns:a16="http://schemas.microsoft.com/office/drawing/2014/main" id="{7C539F9D-13A5-40E3-BA1D-5B28DEB9BE65}"/>
+              </a:ext>
+            </a:extLst>
+          </p:cNvPr>
+          <p:cNvSpPr>
+            <a:spLocks noGrp="1"/>
+          </p:cNvSpPr>
+          <p:nvPr>
+            <p:ph type="title"/>
+          </p:nvPr>
+        </p:nvSpPr>
+        <p:spPr/>
+        <p:txBody>
+          <a:bodyPr/>
+          <a:lstStyle/>
+          <a:p>
+            <a:r>
+              <a:rPr lang="en-US" dirty="0"/>
+              <a:t>Delete Invoice</a:t>
+            </a:r>
+            <a:endParaRPr lang="en-IN" dirty="0"/>
+          </a:p>
+        </p:txBody>
+      </p:sp>
+      <p:sp>
+        <p:nvSpPr>
+          <p:cNvPr id="5" name="Subtitle 4">
+            <a:extLst>
+              <a:ext uri="{FF2B5EF4-FFF2-40B4-BE49-F238E27FC236}">
+                <a16:creationId xmlns:a16="http://schemas.microsoft.com/office/drawing/2014/main" id="{51A35CAE-2202-4C2C-94D3-981223967F21}"/>
+              </a:ext>
+            </a:extLst>
+          </p:cNvPr>
+          <p:cNvSpPr>
+            <a:spLocks noGrp="1"/>
+          </p:cNvSpPr>
+          <p:nvPr>
+            <p:ph type="subTitle" sz="quarter" idx="1"/>
+          </p:nvPr>
+        </p:nvSpPr>
+        <p:spPr/>
+        <p:txBody>
+          <a:bodyPr/>
+          <a:lstStyle/>
+          <a:p>
+            <a:r>
+              <a:rPr lang="en-US" dirty="0"/>
+              <a:t>Input pipeline and output</a:t>
+            </a:r>
+            <a:endParaRPr lang="en-IN" dirty="0"/>
+          </a:p>
+          <a:p>
+            <a:endParaRPr lang="en-IN" dirty="0"/>
+          </a:p>
+        </p:txBody>
+      </p:sp>
+      <p:sp>
+        <p:nvSpPr>
+          <p:cNvPr id="6" name="Text Placeholder 5">
+            <a:extLst>
+              <a:ext uri="{FF2B5EF4-FFF2-40B4-BE49-F238E27FC236}">
+                <a16:creationId xmlns:a16="http://schemas.microsoft.com/office/drawing/2014/main" id="{3A2C217A-ADDD-4376-8C37-14C6F36BB818}"/>
+              </a:ext>
+            </a:extLst>
+          </p:cNvPr>
+          <p:cNvSpPr>
+            <a:spLocks noGrp="1"/>
+          </p:cNvSpPr>
+          <p:nvPr>
+            <p:ph type="body" sz="quarter" idx="11"/>
+          </p:nvPr>
+        </p:nvSpPr>
+        <p:spPr/>
+        <p:txBody>
+          <a:bodyPr/>
+          <a:lstStyle/>
+          <a:p>
+            <a:endParaRPr lang="en-IN" dirty="0"/>
+          </a:p>
+        </p:txBody>
+      </p:sp>
+      <p:sp>
+        <p:nvSpPr>
+          <p:cNvPr id="7" name="Text Placeholder 6">
+            <a:extLst>
+              <a:ext uri="{FF2B5EF4-FFF2-40B4-BE49-F238E27FC236}">
+                <a16:creationId xmlns:a16="http://schemas.microsoft.com/office/drawing/2014/main" id="{BD6C779A-972E-4E80-9B1B-2D594B34D6F1}"/>
+              </a:ext>
+            </a:extLst>
+          </p:cNvPr>
+          <p:cNvSpPr>
+            <a:spLocks noGrp="1"/>
+          </p:cNvSpPr>
+          <p:nvPr>
+            <p:ph type="body" sz="quarter" idx="12"/>
+          </p:nvPr>
+        </p:nvSpPr>
+        <p:spPr/>
+        <p:txBody>
+          <a:bodyPr/>
+          <a:lstStyle/>
+          <a:p>
+            <a:endParaRPr lang="en-IN"/>
+          </a:p>
+        </p:txBody>
+      </p:sp>
+      <p:sp>
+        <p:nvSpPr>
+          <p:cNvPr id="8" name="Content Placeholder 7">
+            <a:extLst>
+              <a:ext uri="{FF2B5EF4-FFF2-40B4-BE49-F238E27FC236}">
+                <a16:creationId xmlns:a16="http://schemas.microsoft.com/office/drawing/2014/main" id="{EF0FEB76-A479-4F2D-B3C7-71ADCC00F0A5}"/>
+              </a:ext>
+            </a:extLst>
+          </p:cNvPr>
+          <p:cNvSpPr>
+            <a:spLocks noGrp="1"/>
+          </p:cNvSpPr>
+          <p:nvPr>
+            <p:ph sz="quarter" idx="21"/>
+          </p:nvPr>
+        </p:nvSpPr>
+        <p:spPr/>
+        <p:txBody>
+          <a:bodyPr/>
+          <a:lstStyle/>
+          <a:p>
+            <a:endParaRPr lang="en-IN"/>
+          </a:p>
+        </p:txBody>
+      </p:sp>
+      <p:sp>
+        <p:nvSpPr>
+          <p:cNvPr id="9" name="Content Placeholder 8">
+            <a:extLst>
+              <a:ext uri="{FF2B5EF4-FFF2-40B4-BE49-F238E27FC236}">
+                <a16:creationId xmlns:a16="http://schemas.microsoft.com/office/drawing/2014/main" id="{E3963E5F-875E-440C-A29D-EF72A8B490EA}"/>
+              </a:ext>
+            </a:extLst>
+          </p:cNvPr>
+          <p:cNvSpPr>
+            <a:spLocks noGrp="1"/>
+          </p:cNvSpPr>
+          <p:nvPr>
+            <p:ph sz="quarter" idx="22"/>
+          </p:nvPr>
+        </p:nvSpPr>
+        <p:spPr/>
+        <p:txBody>
+          <a:bodyPr/>
+          <a:lstStyle/>
+          <a:p>
+            <a:endParaRPr lang="en-IN"/>
+          </a:p>
+        </p:txBody>
+      </p:sp>
+      <p:pic>
+        <p:nvPicPr>
+          <p:cNvPr id="11" name="Picture 10">
+            <a:extLst>
+              <a:ext uri="{FF2B5EF4-FFF2-40B4-BE49-F238E27FC236}">
+                <a16:creationId xmlns:a16="http://schemas.microsoft.com/office/drawing/2014/main" id="{AAF841F3-7AFA-4219-B37E-229BB4ACA250}"/>
+              </a:ext>
+            </a:extLst>
+          </p:cNvPr>
+          <p:cNvPicPr>
+            <a:picLocks noChangeAspect="1"/>
+          </p:cNvPicPr>
+          <p:nvPr/>
+        </p:nvPicPr>
+        <p:blipFill>
+          <a:blip r:embed="rId2"/>
+          <a:stretch>
+            <a:fillRect/>
+          </a:stretch>
+        </p:blipFill>
+        <p:spPr>
+          <a:xfrm>
+            <a:off x="6095250" y="1988840"/>
+            <a:ext cx="5963312" cy="1721551"/>
+          </a:xfrm>
+          <a:prstGeom prst="rect">
+            <a:avLst/>
+          </a:prstGeom>
+        </p:spPr>
+      </p:pic>
+      <p:pic>
+        <p:nvPicPr>
+          <p:cNvPr id="13" name="Picture 12">
+            <a:extLst>
+              <a:ext uri="{FF2B5EF4-FFF2-40B4-BE49-F238E27FC236}">
+                <a16:creationId xmlns:a16="http://schemas.microsoft.com/office/drawing/2014/main" id="{3548EB3D-5DE6-46FA-AC98-D5821138CAEC}"/>
+              </a:ext>
+            </a:extLst>
+          </p:cNvPr>
+          <p:cNvPicPr>
+            <a:picLocks noChangeAspect="1"/>
+          </p:cNvPicPr>
+          <p:nvPr/>
+        </p:nvPicPr>
+        <p:blipFill>
+          <a:blip r:embed="rId3"/>
+          <a:stretch>
+            <a:fillRect/>
+          </a:stretch>
+        </p:blipFill>
+        <p:spPr>
+          <a:xfrm>
+            <a:off x="327837" y="1483913"/>
+            <a:ext cx="5637214" cy="2442598"/>
+          </a:xfrm>
+          <a:prstGeom prst="rect">
+            <a:avLst/>
+          </a:prstGeom>
+        </p:spPr>
+      </p:pic>
+    </p:spTree>
+    <p:extLst>
+      <p:ext uri="{BB962C8B-B14F-4D97-AF65-F5344CB8AC3E}">
+        <p14:creationId xmlns:p14="http://schemas.microsoft.com/office/powerpoint/2010/main" val="2464069141"/>
+      </p:ext>
+    </p:extLst>
+  </p:cSld>
+  <p:clrMapOvr>
+    <a:masterClrMapping/>
+  </p:clrMapOvr>
+</p:sld>
+</file>
+
+<file path=ppt/slides/slide13.xml><?xml version="1.0" encoding="utf-8"?>
+<p:sld xmlns:a="http://schemas.openxmlformats.org/drawingml/2006/main" xmlns:r="http://schemas.openxmlformats.org/officeDocument/2006/relationships" xmlns:p="http://schemas.openxmlformats.org/presentationml/2006/main">
+  <p:cSld>
+    <p:spTree>
+      <p:nvGrpSpPr>
+        <p:cNvPr id="1" name=""/>
+        <p:cNvGrpSpPr/>
+        <p:nvPr/>
+      </p:nvGrpSpPr>
+      <p:grpSpPr>
+        <a:xfrm>
+          <a:off x="0" y="0"/>
+          <a:ext cx="0" cy="0"/>
+          <a:chOff x="0" y="0"/>
+          <a:chExt cx="0" cy="0"/>
+        </a:xfrm>
+      </p:grpSpPr>
+      <p:sp>
+        <p:nvSpPr>
+          <p:cNvPr id="2" name="Footer Placeholder 1">
+            <a:extLst>
+              <a:ext uri="{FF2B5EF4-FFF2-40B4-BE49-F238E27FC236}">
+                <a16:creationId xmlns:a16="http://schemas.microsoft.com/office/drawing/2014/main" id="{17254AEB-7560-4FDF-83DE-ACEDD50906ED}"/>
+              </a:ext>
+            </a:extLst>
+          </p:cNvPr>
+          <p:cNvSpPr>
+            <a:spLocks noGrp="1"/>
+          </p:cNvSpPr>
+          <p:nvPr>
+            <p:ph type="ftr" sz="quarter" idx="3"/>
+          </p:nvPr>
+        </p:nvSpPr>
+        <p:spPr/>
+        <p:txBody>
+          <a:bodyPr/>
+          <a:lstStyle/>
+          <a:p>
+            <a:r>
+              <a:rPr lang="en-US"/>
+              <a:t>© 2021 Software AG. All rights reserved. For internal use only and for Software AG Partners.</a:t>
+            </a:r>
+            <a:endParaRPr lang="en-US" dirty="0"/>
+          </a:p>
+        </p:txBody>
+      </p:sp>
+      <p:sp>
+        <p:nvSpPr>
+          <p:cNvPr id="3" name="Slide Number Placeholder 2">
+            <a:extLst>
+              <a:ext uri="{FF2B5EF4-FFF2-40B4-BE49-F238E27FC236}">
+                <a16:creationId xmlns:a16="http://schemas.microsoft.com/office/drawing/2014/main" id="{7C63E64A-9F9B-478B-85FC-2B62EB076A62}"/>
+              </a:ext>
+            </a:extLst>
+          </p:cNvPr>
+          <p:cNvSpPr>
+            <a:spLocks noGrp="1"/>
+          </p:cNvSpPr>
+          <p:nvPr>
+            <p:ph type="sldNum" sz="quarter" idx="4"/>
+          </p:nvPr>
+        </p:nvSpPr>
+        <p:spPr/>
+        <p:txBody>
+          <a:bodyPr/>
+          <a:lstStyle/>
+          <a:p>
+            <a:fld id="{22FF84AA-2C76-4AF1-8502-73D25D47F37C}" type="slidenum">
+              <a:rPr lang="en-US"/>
+              <a:pPr/>
+              <a:t>13</a:t>
+            </a:fld>
+            <a:endParaRPr lang="en-US" dirty="0"/>
+          </a:p>
+        </p:txBody>
+      </p:sp>
+    </p:spTree>
+    <p:extLst>
+      <p:ext uri="{BB962C8B-B14F-4D97-AF65-F5344CB8AC3E}">
+        <p14:creationId xmlns:p14="http://schemas.microsoft.com/office/powerpoint/2010/main" val="1534332258"/>
       </p:ext>
     </p:extLst>
   </p:cSld>
@@ -33982,7 +35009,7 @@
                 <a:effectLst/>
                 <a:latin typeface="-apple-system"/>
               </a:rPr>
-              <a:t> Books is online accounting software that manages your finances, keeps you GST compliant, automates business workflows, and helps you work collectively across departments</a:t>
+              <a:t> Books is an online accounting software that manages your finances, keeps you GST compliant, automates business workflows, and helps you work collectively across departments</a:t>
             </a:r>
             <a:r>
               <a:rPr lang="en-US" b="1" i="0" dirty="0">
@@ -34040,6 +35067,21 @@
               <a:t> Books Accounting app.</a:t>
             </a:r>
           </a:p>
+          <a:p>
+            <a:endParaRPr lang="en-US" dirty="0"/>
+          </a:p>
+          <a:p>
+            <a:r>
+              <a:rPr lang="en-US" dirty="0">
+                <a:hlinkClick r:id="rId3"/>
+              </a:rPr>
+              <a:t>https://www.zoho.com/in/books/</a:t>
+            </a:r>
+            <a:endParaRPr lang="en-US" dirty="0"/>
+          </a:p>
+          <a:p>
+            <a:endParaRPr lang="en-US" dirty="0"/>
+          </a:p>
         </p:txBody>
       </p:sp>
     </p:spTree>
@@ -34056,6 +35098,937 @@
 </file>
 
 <file path=ppt/slides/slide3.xml><?xml version="1.0" encoding="utf-8"?>
+<p:sld xmlns:a="http://schemas.openxmlformats.org/drawingml/2006/main" xmlns:r="http://schemas.openxmlformats.org/officeDocument/2006/relationships" xmlns:p="http://schemas.openxmlformats.org/presentationml/2006/main">
+  <p:cSld>
+    <p:spTree>
+      <p:nvGrpSpPr>
+        <p:cNvPr id="1" name=""/>
+        <p:cNvGrpSpPr/>
+        <p:nvPr/>
+      </p:nvGrpSpPr>
+      <p:grpSpPr>
+        <a:xfrm>
+          <a:off x="0" y="0"/>
+          <a:ext cx="0" cy="0"/>
+          <a:chOff x="0" y="0"/>
+          <a:chExt cx="0" cy="0"/>
+        </a:xfrm>
+      </p:grpSpPr>
+      <p:sp>
+        <p:nvSpPr>
+          <p:cNvPr id="2" name="Title 1">
+            <a:extLst>
+              <a:ext uri="{FF2B5EF4-FFF2-40B4-BE49-F238E27FC236}">
+                <a16:creationId xmlns:a16="http://schemas.microsoft.com/office/drawing/2014/main" id="{1F3AE372-8A48-45B3-883A-E8CDC3671515}"/>
+              </a:ext>
+            </a:extLst>
+          </p:cNvPr>
+          <p:cNvSpPr>
+            <a:spLocks noGrp="1"/>
+          </p:cNvSpPr>
+          <p:nvPr>
+            <p:ph type="title"/>
+          </p:nvPr>
+        </p:nvSpPr>
+        <p:spPr/>
+        <p:txBody>
+          <a:bodyPr/>
+          <a:lstStyle/>
+          <a:p>
+            <a:r>
+              <a:rPr lang="en-US" dirty="0"/>
+              <a:t>API and Documentation</a:t>
+            </a:r>
+            <a:endParaRPr lang="en-IN" dirty="0"/>
+          </a:p>
+        </p:txBody>
+      </p:sp>
+      <p:sp>
+        <p:nvSpPr>
+          <p:cNvPr id="3" name="Footer Placeholder 2">
+            <a:extLst>
+              <a:ext uri="{FF2B5EF4-FFF2-40B4-BE49-F238E27FC236}">
+                <a16:creationId xmlns:a16="http://schemas.microsoft.com/office/drawing/2014/main" id="{62C7EF99-CE59-47C5-8B1C-D5C7EB9BBFF6}"/>
+              </a:ext>
+            </a:extLst>
+          </p:cNvPr>
+          <p:cNvSpPr>
+            <a:spLocks noGrp="1"/>
+          </p:cNvSpPr>
+          <p:nvPr>
+            <p:ph type="ftr" sz="quarter" idx="3"/>
+          </p:nvPr>
+        </p:nvSpPr>
+        <p:spPr/>
+        <p:txBody>
+          <a:bodyPr/>
+          <a:lstStyle/>
+          <a:p>
+            <a:r>
+              <a:rPr lang="en-US"/>
+              <a:t>© 2021 Software AG. All rights reserved. For internal use only and for Software AG Partners.</a:t>
+            </a:r>
+            <a:endParaRPr lang="en-US" dirty="0"/>
+          </a:p>
+        </p:txBody>
+      </p:sp>
+      <p:sp>
+        <p:nvSpPr>
+          <p:cNvPr id="4" name="Slide Number Placeholder 3">
+            <a:extLst>
+              <a:ext uri="{FF2B5EF4-FFF2-40B4-BE49-F238E27FC236}">
+                <a16:creationId xmlns:a16="http://schemas.microsoft.com/office/drawing/2014/main" id="{DC471F83-92D0-47EB-8307-934BB2F86FDC}"/>
+              </a:ext>
+            </a:extLst>
+          </p:cNvPr>
+          <p:cNvSpPr>
+            <a:spLocks noGrp="1"/>
+          </p:cNvSpPr>
+          <p:nvPr>
+            <p:ph type="sldNum" sz="quarter" idx="4"/>
+          </p:nvPr>
+        </p:nvSpPr>
+        <p:spPr/>
+        <p:txBody>
+          <a:bodyPr/>
+          <a:lstStyle/>
+          <a:p>
+            <a:fld id="{22FF84AA-2C76-4AF1-8502-73D25D47F37C}" type="slidenum">
+              <a:rPr lang="en-US" smtClean="0"/>
+              <a:pPr/>
+              <a:t>3</a:t>
+            </a:fld>
+            <a:endParaRPr lang="en-US" dirty="0"/>
+          </a:p>
+        </p:txBody>
+      </p:sp>
+      <p:sp>
+        <p:nvSpPr>
+          <p:cNvPr id="5" name="Subtitle 4">
+            <a:extLst>
+              <a:ext uri="{FF2B5EF4-FFF2-40B4-BE49-F238E27FC236}">
+                <a16:creationId xmlns:a16="http://schemas.microsoft.com/office/drawing/2014/main" id="{0F1CAD88-97BC-4D81-B807-D1A7D018E1AE}"/>
+              </a:ext>
+            </a:extLst>
+          </p:cNvPr>
+          <p:cNvSpPr>
+            <a:spLocks noGrp="1"/>
+          </p:cNvSpPr>
+          <p:nvPr>
+            <p:ph type="subTitle" sz="quarter" idx="1"/>
+          </p:nvPr>
+        </p:nvSpPr>
+        <p:spPr/>
+        <p:txBody>
+          <a:bodyPr/>
+          <a:lstStyle/>
+          <a:p>
+            <a:r>
+              <a:rPr lang="en-US" dirty="0"/>
+              <a:t>API</a:t>
+            </a:r>
+            <a:endParaRPr lang="en-IN" dirty="0"/>
+          </a:p>
+        </p:txBody>
+      </p:sp>
+      <p:sp>
+        <p:nvSpPr>
+          <p:cNvPr id="6" name="Content Placeholder 5">
+            <a:extLst>
+              <a:ext uri="{FF2B5EF4-FFF2-40B4-BE49-F238E27FC236}">
+                <a16:creationId xmlns:a16="http://schemas.microsoft.com/office/drawing/2014/main" id="{98A53CE3-EF57-4AE0-974E-F0B50705F4B1}"/>
+              </a:ext>
+            </a:extLst>
+          </p:cNvPr>
+          <p:cNvSpPr>
+            <a:spLocks noGrp="1"/>
+          </p:cNvSpPr>
+          <p:nvPr>
+            <p:ph sz="quarter" idx="21"/>
+          </p:nvPr>
+        </p:nvSpPr>
+        <p:spPr/>
+        <p:txBody>
+          <a:bodyPr/>
+          <a:lstStyle/>
+          <a:p>
+            <a:pPr marL="285750" indent="-285750">
+              <a:buFont typeface="Arial" panose="020B0604020202020204" pitchFamily="34" charset="0"/>
+              <a:buChar char="•"/>
+            </a:pPr>
+            <a:r>
+              <a:rPr lang="en-US" dirty="0"/>
+              <a:t>API docs: </a:t>
+            </a:r>
+            <a:r>
+              <a:rPr lang="en-US" dirty="0">
+                <a:hlinkClick r:id="rId2"/>
+              </a:rPr>
+              <a:t>https://www.zoho.com/books/api/v3/#introduction</a:t>
+            </a:r>
+            <a:endParaRPr lang="en-US" dirty="0"/>
+          </a:p>
+          <a:p>
+            <a:pPr marL="285750" indent="-285750">
+              <a:buFont typeface="Arial" panose="020B0604020202020204" pitchFamily="34" charset="0"/>
+              <a:buChar char="•"/>
+            </a:pPr>
+            <a:r>
+              <a:rPr lang="en-US" dirty="0" err="1"/>
+              <a:t>Zoho</a:t>
+            </a:r>
+            <a:r>
+              <a:rPr lang="en-US" dirty="0"/>
+              <a:t> Books provides numerous APIs to interact with it, </a:t>
+            </a:r>
+          </a:p>
+          <a:p>
+            <a:pPr marL="285750" indent="-285750">
+              <a:buFont typeface="Arial" panose="020B0604020202020204" pitchFamily="34" charset="0"/>
+              <a:buChar char="•"/>
+            </a:pPr>
+            <a:r>
+              <a:rPr lang="en-US" dirty="0"/>
+              <a:t>It has multiple modules each containing more 10 methods, totally more than 200 methods, following are the modules</a:t>
+            </a:r>
+          </a:p>
+          <a:p>
+            <a:pPr marL="285750" indent="-285750">
+              <a:buFont typeface="Arial" panose="020B0604020202020204" pitchFamily="34" charset="0"/>
+              <a:buChar char="•"/>
+            </a:pPr>
+            <a:r>
+              <a:rPr lang="en-US" dirty="0"/>
+              <a:t>Invoices,</a:t>
+            </a:r>
+            <a:r>
+              <a:rPr lang="en-IN" dirty="0"/>
+              <a:t>Contacts, Expenses, Bills, Credit Notes, Debit Notes, Customer payments, Bank Accounts, Vendor Payments etc..</a:t>
+            </a:r>
+            <a:endParaRPr lang="en-US" dirty="0"/>
+          </a:p>
+        </p:txBody>
+      </p:sp>
+    </p:spTree>
+    <p:extLst>
+      <p:ext uri="{BB962C8B-B14F-4D97-AF65-F5344CB8AC3E}">
+        <p14:creationId xmlns:p14="http://schemas.microsoft.com/office/powerpoint/2010/main" val="1700820825"/>
+      </p:ext>
+    </p:extLst>
+  </p:cSld>
+  <p:clrMapOvr>
+    <a:masterClrMapping/>
+  </p:clrMapOvr>
+</p:sld>
+</file>
+
+<file path=ppt/slides/slide4.xml><?xml version="1.0" encoding="utf-8"?>
+<p:sld xmlns:a="http://schemas.openxmlformats.org/drawingml/2006/main" xmlns:r="http://schemas.openxmlformats.org/officeDocument/2006/relationships" xmlns:p="http://schemas.openxmlformats.org/presentationml/2006/main">
+  <p:cSld>
+    <p:spTree>
+      <p:nvGrpSpPr>
+        <p:cNvPr id="1" name=""/>
+        <p:cNvGrpSpPr/>
+        <p:nvPr/>
+      </p:nvGrpSpPr>
+      <p:grpSpPr>
+        <a:xfrm>
+          <a:off x="0" y="0"/>
+          <a:ext cx="0" cy="0"/>
+          <a:chOff x="0" y="0"/>
+          <a:chExt cx="0" cy="0"/>
+        </a:xfrm>
+      </p:grpSpPr>
+      <p:sp>
+        <p:nvSpPr>
+          <p:cNvPr id="2" name="Title 1">
+            <a:extLst>
+              <a:ext uri="{FF2B5EF4-FFF2-40B4-BE49-F238E27FC236}">
+                <a16:creationId xmlns:a16="http://schemas.microsoft.com/office/drawing/2014/main" id="{2F6CDE16-245C-4C10-9FFF-8FDB14E8C76C}"/>
+              </a:ext>
+            </a:extLst>
+          </p:cNvPr>
+          <p:cNvSpPr>
+            <a:spLocks noGrp="1"/>
+          </p:cNvSpPr>
+          <p:nvPr>
+            <p:ph type="title"/>
+          </p:nvPr>
+        </p:nvSpPr>
+        <p:spPr/>
+        <p:txBody>
+          <a:bodyPr/>
+          <a:lstStyle/>
+          <a:p>
+            <a:r>
+              <a:rPr lang="en-US" dirty="0"/>
+              <a:t>Auth</a:t>
+            </a:r>
+            <a:endParaRPr lang="en-IN" dirty="0"/>
+          </a:p>
+        </p:txBody>
+      </p:sp>
+      <p:sp>
+        <p:nvSpPr>
+          <p:cNvPr id="3" name="Footer Placeholder 2">
+            <a:extLst>
+              <a:ext uri="{FF2B5EF4-FFF2-40B4-BE49-F238E27FC236}">
+                <a16:creationId xmlns:a16="http://schemas.microsoft.com/office/drawing/2014/main" id="{8DFCF67F-D2BF-4AEC-AF06-7E785CD990CD}"/>
+              </a:ext>
+            </a:extLst>
+          </p:cNvPr>
+          <p:cNvSpPr>
+            <a:spLocks noGrp="1"/>
+          </p:cNvSpPr>
+          <p:nvPr>
+            <p:ph type="ftr" sz="quarter" idx="3"/>
+          </p:nvPr>
+        </p:nvSpPr>
+        <p:spPr/>
+        <p:txBody>
+          <a:bodyPr/>
+          <a:lstStyle/>
+          <a:p>
+            <a:r>
+              <a:rPr lang="en-US"/>
+              <a:t>© 2021 Software AG. All rights reserved. For internal use only and for Software AG Partners.</a:t>
+            </a:r>
+            <a:endParaRPr lang="en-US" dirty="0"/>
+          </a:p>
+        </p:txBody>
+      </p:sp>
+      <p:sp>
+        <p:nvSpPr>
+          <p:cNvPr id="4" name="Slide Number Placeholder 3">
+            <a:extLst>
+              <a:ext uri="{FF2B5EF4-FFF2-40B4-BE49-F238E27FC236}">
+                <a16:creationId xmlns:a16="http://schemas.microsoft.com/office/drawing/2014/main" id="{ED7DA5F9-51F7-4002-A8ED-71ECFDE5760C}"/>
+              </a:ext>
+            </a:extLst>
+          </p:cNvPr>
+          <p:cNvSpPr>
+            <a:spLocks noGrp="1"/>
+          </p:cNvSpPr>
+          <p:nvPr>
+            <p:ph type="sldNum" sz="quarter" idx="4"/>
+          </p:nvPr>
+        </p:nvSpPr>
+        <p:spPr/>
+        <p:txBody>
+          <a:bodyPr/>
+          <a:lstStyle/>
+          <a:p>
+            <a:fld id="{22FF84AA-2C76-4AF1-8502-73D25D47F37C}" type="slidenum">
+              <a:rPr lang="en-US" smtClean="0"/>
+              <a:pPr/>
+              <a:t>4</a:t>
+            </a:fld>
+            <a:endParaRPr lang="en-US" dirty="0"/>
+          </a:p>
+        </p:txBody>
+      </p:sp>
+      <p:sp>
+        <p:nvSpPr>
+          <p:cNvPr id="5" name="Subtitle 4">
+            <a:extLst>
+              <a:ext uri="{FF2B5EF4-FFF2-40B4-BE49-F238E27FC236}">
+                <a16:creationId xmlns:a16="http://schemas.microsoft.com/office/drawing/2014/main" id="{9F4E6B64-CBB1-4B97-B851-26C6890B435A}"/>
+              </a:ext>
+            </a:extLst>
+          </p:cNvPr>
+          <p:cNvSpPr>
+            <a:spLocks noGrp="1"/>
+          </p:cNvSpPr>
+          <p:nvPr>
+            <p:ph type="subTitle" sz="quarter" idx="1"/>
+          </p:nvPr>
+        </p:nvSpPr>
+        <p:spPr/>
+        <p:txBody>
+          <a:bodyPr/>
+          <a:lstStyle/>
+          <a:p>
+            <a:r>
+              <a:rPr lang="en-US" dirty="0"/>
+              <a:t>OAuth 2.0</a:t>
+            </a:r>
+            <a:endParaRPr lang="en-IN" dirty="0"/>
+          </a:p>
+        </p:txBody>
+      </p:sp>
+      <p:sp>
+        <p:nvSpPr>
+          <p:cNvPr id="6" name="Content Placeholder 5">
+            <a:extLst>
+              <a:ext uri="{FF2B5EF4-FFF2-40B4-BE49-F238E27FC236}">
+                <a16:creationId xmlns:a16="http://schemas.microsoft.com/office/drawing/2014/main" id="{62D5E9AB-1765-4AE6-AD62-72BEF5F836EE}"/>
+              </a:ext>
+            </a:extLst>
+          </p:cNvPr>
+          <p:cNvSpPr>
+            <a:spLocks noGrp="1"/>
+          </p:cNvSpPr>
+          <p:nvPr>
+            <p:ph sz="quarter" idx="21"/>
+          </p:nvPr>
+        </p:nvSpPr>
+        <p:spPr/>
+        <p:txBody>
+          <a:bodyPr/>
+          <a:lstStyle/>
+          <a:p>
+            <a:r>
+              <a:rPr lang="en-US" dirty="0" err="1"/>
+              <a:t>Zoho</a:t>
+            </a:r>
+            <a:r>
+              <a:rPr lang="en-US" dirty="0"/>
+              <a:t> Books supports OAuth 2.0</a:t>
+            </a:r>
+          </a:p>
+          <a:p>
+            <a:r>
+              <a:rPr lang="en-US" dirty="0"/>
+              <a:t>Prerequisites – a </a:t>
+            </a:r>
+            <a:r>
+              <a:rPr lang="en-US" dirty="0" err="1"/>
+              <a:t>Zoho</a:t>
+            </a:r>
+            <a:r>
+              <a:rPr lang="en-US" dirty="0"/>
+              <a:t> Account (14 day trial period available)</a:t>
+            </a:r>
+          </a:p>
+          <a:p>
+            <a:r>
+              <a:rPr lang="en-US" dirty="0" err="1"/>
+              <a:t>Zoho</a:t>
+            </a:r>
+            <a:r>
+              <a:rPr lang="en-US" dirty="0"/>
+              <a:t> has 4 Datacenters across the globe, we should explicitly enable the account across all datacenters.</a:t>
+            </a:r>
+          </a:p>
+          <a:p>
+            <a:endParaRPr lang="en-IN" dirty="0"/>
+          </a:p>
+        </p:txBody>
+      </p:sp>
+      <p:pic>
+        <p:nvPicPr>
+          <p:cNvPr id="8" name="Picture 7">
+            <a:extLst>
+              <a:ext uri="{FF2B5EF4-FFF2-40B4-BE49-F238E27FC236}">
+                <a16:creationId xmlns:a16="http://schemas.microsoft.com/office/drawing/2014/main" id="{ED8044BB-2B85-44A6-B480-54511B4BFCFB}"/>
+              </a:ext>
+            </a:extLst>
+          </p:cNvPr>
+          <p:cNvPicPr>
+            <a:picLocks noChangeAspect="1"/>
+          </p:cNvPicPr>
+          <p:nvPr/>
+        </p:nvPicPr>
+        <p:blipFill>
+          <a:blip r:embed="rId2"/>
+          <a:stretch>
+            <a:fillRect/>
+          </a:stretch>
+        </p:blipFill>
+        <p:spPr>
+          <a:xfrm>
+            <a:off x="516831" y="3072963"/>
+            <a:ext cx="4301678" cy="3370387"/>
+          </a:xfrm>
+          <a:prstGeom prst="rect">
+            <a:avLst/>
+          </a:prstGeom>
+        </p:spPr>
+      </p:pic>
+      <p:pic>
+        <p:nvPicPr>
+          <p:cNvPr id="10" name="Picture 9">
+            <a:extLst>
+              <a:ext uri="{FF2B5EF4-FFF2-40B4-BE49-F238E27FC236}">
+                <a16:creationId xmlns:a16="http://schemas.microsoft.com/office/drawing/2014/main" id="{22D9D1FF-30E8-4FFB-989C-1468C8154335}"/>
+              </a:ext>
+            </a:extLst>
+          </p:cNvPr>
+          <p:cNvPicPr>
+            <a:picLocks noChangeAspect="1"/>
+          </p:cNvPicPr>
+          <p:nvPr/>
+        </p:nvPicPr>
+        <p:blipFill>
+          <a:blip r:embed="rId3"/>
+          <a:stretch>
+            <a:fillRect/>
+          </a:stretch>
+        </p:blipFill>
+        <p:spPr>
+          <a:xfrm>
+            <a:off x="5119268" y="3065569"/>
+            <a:ext cx="4508450" cy="3792431"/>
+          </a:xfrm>
+          <a:prstGeom prst="rect">
+            <a:avLst/>
+          </a:prstGeom>
+        </p:spPr>
+      </p:pic>
+    </p:spTree>
+    <p:extLst>
+      <p:ext uri="{BB962C8B-B14F-4D97-AF65-F5344CB8AC3E}">
+        <p14:creationId xmlns:p14="http://schemas.microsoft.com/office/powerpoint/2010/main" val="303185499"/>
+      </p:ext>
+    </p:extLst>
+  </p:cSld>
+  <p:clrMapOvr>
+    <a:masterClrMapping/>
+  </p:clrMapOvr>
+</p:sld>
+</file>
+
+<file path=ppt/slides/slide5.xml><?xml version="1.0" encoding="utf-8"?>
+<p:sld xmlns:a="http://schemas.openxmlformats.org/drawingml/2006/main" xmlns:r="http://schemas.openxmlformats.org/officeDocument/2006/relationships" xmlns:p="http://schemas.openxmlformats.org/presentationml/2006/main">
+  <p:cSld>
+    <p:spTree>
+      <p:nvGrpSpPr>
+        <p:cNvPr id="1" name=""/>
+        <p:cNvGrpSpPr/>
+        <p:nvPr/>
+      </p:nvGrpSpPr>
+      <p:grpSpPr>
+        <a:xfrm>
+          <a:off x="0" y="0"/>
+          <a:ext cx="0" cy="0"/>
+          <a:chOff x="0" y="0"/>
+          <a:chExt cx="0" cy="0"/>
+        </a:xfrm>
+      </p:grpSpPr>
+      <p:sp>
+        <p:nvSpPr>
+          <p:cNvPr id="2" name="Title 1">
+            <a:extLst>
+              <a:ext uri="{FF2B5EF4-FFF2-40B4-BE49-F238E27FC236}">
+                <a16:creationId xmlns:a16="http://schemas.microsoft.com/office/drawing/2014/main" id="{7D17BDD2-639A-4212-8F2C-A0CEB7488434}"/>
+              </a:ext>
+            </a:extLst>
+          </p:cNvPr>
+          <p:cNvSpPr>
+            <a:spLocks noGrp="1"/>
+          </p:cNvSpPr>
+          <p:nvPr>
+            <p:ph type="title"/>
+          </p:nvPr>
+        </p:nvSpPr>
+        <p:spPr/>
+        <p:txBody>
+          <a:bodyPr/>
+          <a:lstStyle/>
+          <a:p>
+            <a:r>
+              <a:rPr lang="en-US" dirty="0" err="1"/>
+              <a:t>Zoho</a:t>
+            </a:r>
+            <a:r>
+              <a:rPr lang="en-US" dirty="0"/>
+              <a:t> Books Invoice</a:t>
+            </a:r>
+            <a:endParaRPr lang="en-IN" dirty="0"/>
+          </a:p>
+        </p:txBody>
+      </p:sp>
+      <p:sp>
+        <p:nvSpPr>
+          <p:cNvPr id="3" name="Footer Placeholder 2">
+            <a:extLst>
+              <a:ext uri="{FF2B5EF4-FFF2-40B4-BE49-F238E27FC236}">
+                <a16:creationId xmlns:a16="http://schemas.microsoft.com/office/drawing/2014/main" id="{0A61AEEF-8EDD-4CE4-BA70-B25A08841F18}"/>
+              </a:ext>
+            </a:extLst>
+          </p:cNvPr>
+          <p:cNvSpPr>
+            <a:spLocks noGrp="1"/>
+          </p:cNvSpPr>
+          <p:nvPr>
+            <p:ph type="ftr" sz="quarter" idx="3"/>
+          </p:nvPr>
+        </p:nvSpPr>
+        <p:spPr/>
+        <p:txBody>
+          <a:bodyPr/>
+          <a:lstStyle/>
+          <a:p>
+            <a:r>
+              <a:rPr lang="en-US"/>
+              <a:t>© 2021 Software AG. All rights reserved. For internal use only and for Software AG Partners.</a:t>
+            </a:r>
+            <a:endParaRPr lang="en-US" dirty="0"/>
+          </a:p>
+        </p:txBody>
+      </p:sp>
+      <p:sp>
+        <p:nvSpPr>
+          <p:cNvPr id="4" name="Slide Number Placeholder 3">
+            <a:extLst>
+              <a:ext uri="{FF2B5EF4-FFF2-40B4-BE49-F238E27FC236}">
+                <a16:creationId xmlns:a16="http://schemas.microsoft.com/office/drawing/2014/main" id="{A2699162-C68C-4A4E-9D24-B7B2741B8537}"/>
+              </a:ext>
+            </a:extLst>
+          </p:cNvPr>
+          <p:cNvSpPr>
+            <a:spLocks noGrp="1"/>
+          </p:cNvSpPr>
+          <p:nvPr>
+            <p:ph type="sldNum" sz="quarter" idx="4"/>
+          </p:nvPr>
+        </p:nvSpPr>
+        <p:spPr/>
+        <p:txBody>
+          <a:bodyPr/>
+          <a:lstStyle/>
+          <a:p>
+            <a:fld id="{22FF84AA-2C76-4AF1-8502-73D25D47F37C}" type="slidenum">
+              <a:rPr lang="en-US" smtClean="0"/>
+              <a:pPr/>
+              <a:t>5</a:t>
+            </a:fld>
+            <a:endParaRPr lang="en-US" dirty="0"/>
+          </a:p>
+        </p:txBody>
+      </p:sp>
+      <p:sp>
+        <p:nvSpPr>
+          <p:cNvPr id="5" name="Subtitle 4">
+            <a:extLst>
+              <a:ext uri="{FF2B5EF4-FFF2-40B4-BE49-F238E27FC236}">
+                <a16:creationId xmlns:a16="http://schemas.microsoft.com/office/drawing/2014/main" id="{39EAC3BE-426F-478B-B3F0-255C99181C69}"/>
+              </a:ext>
+            </a:extLst>
+          </p:cNvPr>
+          <p:cNvSpPr>
+            <a:spLocks noGrp="1"/>
+          </p:cNvSpPr>
+          <p:nvPr>
+            <p:ph type="subTitle" sz="quarter" idx="1"/>
+          </p:nvPr>
+        </p:nvSpPr>
+        <p:spPr/>
+        <p:txBody>
+          <a:bodyPr/>
+          <a:lstStyle/>
+          <a:p>
+            <a:endParaRPr lang="en-IN"/>
+          </a:p>
+        </p:txBody>
+      </p:sp>
+      <p:pic>
+        <p:nvPicPr>
+          <p:cNvPr id="8" name="Content Placeholder 7">
+            <a:extLst>
+              <a:ext uri="{FF2B5EF4-FFF2-40B4-BE49-F238E27FC236}">
+                <a16:creationId xmlns:a16="http://schemas.microsoft.com/office/drawing/2014/main" id="{D0CB5DC8-6293-4FD2-8BC4-2FA8F6DAF8D3}"/>
+              </a:ext>
+            </a:extLst>
+          </p:cNvPr>
+          <p:cNvPicPr>
+            <a:picLocks noGrp="1" noChangeAspect="1"/>
+          </p:cNvPicPr>
+          <p:nvPr>
+            <p:ph sz="quarter" idx="21"/>
+          </p:nvPr>
+        </p:nvPicPr>
+        <p:blipFill>
+          <a:blip r:embed="rId2"/>
+          <a:stretch>
+            <a:fillRect/>
+          </a:stretch>
+        </p:blipFill>
+        <p:spPr>
+          <a:xfrm>
+            <a:off x="543678" y="1583849"/>
+            <a:ext cx="10395901" cy="4665663"/>
+          </a:xfrm>
+        </p:spPr>
+      </p:pic>
+    </p:spTree>
+    <p:extLst>
+      <p:ext uri="{BB962C8B-B14F-4D97-AF65-F5344CB8AC3E}">
+        <p14:creationId xmlns:p14="http://schemas.microsoft.com/office/powerpoint/2010/main" val="4287552835"/>
+      </p:ext>
+    </p:extLst>
+  </p:cSld>
+  <p:clrMapOvr>
+    <a:masterClrMapping/>
+  </p:clrMapOvr>
+</p:sld>
+</file>
+
+<file path=ppt/slides/slide6.xml><?xml version="1.0" encoding="utf-8"?>
+<p:sld xmlns:a="http://schemas.openxmlformats.org/drawingml/2006/main" xmlns:r="http://schemas.openxmlformats.org/officeDocument/2006/relationships" xmlns:p="http://schemas.openxmlformats.org/presentationml/2006/main">
+  <p:cSld>
+    <p:spTree>
+      <p:nvGrpSpPr>
+        <p:cNvPr id="1" name=""/>
+        <p:cNvGrpSpPr/>
+        <p:nvPr/>
+      </p:nvGrpSpPr>
+      <p:grpSpPr>
+        <a:xfrm>
+          <a:off x="0" y="0"/>
+          <a:ext cx="0" cy="0"/>
+          <a:chOff x="0" y="0"/>
+          <a:chExt cx="0" cy="0"/>
+        </a:xfrm>
+      </p:grpSpPr>
+      <p:sp>
+        <p:nvSpPr>
+          <p:cNvPr id="2" name="Title 1">
+            <a:extLst>
+              <a:ext uri="{FF2B5EF4-FFF2-40B4-BE49-F238E27FC236}">
+                <a16:creationId xmlns:a16="http://schemas.microsoft.com/office/drawing/2014/main" id="{9C0C76C4-7834-499F-9B13-E0D7E3B16596}"/>
+              </a:ext>
+            </a:extLst>
+          </p:cNvPr>
+          <p:cNvSpPr>
+            <a:spLocks noGrp="1"/>
+          </p:cNvSpPr>
+          <p:nvPr>
+            <p:ph type="title"/>
+          </p:nvPr>
+        </p:nvSpPr>
+        <p:spPr/>
+        <p:txBody>
+          <a:bodyPr/>
+          <a:lstStyle/>
+          <a:p>
+            <a:r>
+              <a:rPr lang="en-US" dirty="0"/>
+              <a:t>Connector Actions</a:t>
+            </a:r>
+            <a:endParaRPr lang="en-IN" dirty="0"/>
+          </a:p>
+        </p:txBody>
+      </p:sp>
+      <p:sp>
+        <p:nvSpPr>
+          <p:cNvPr id="3" name="Footer Placeholder 2">
+            <a:extLst>
+              <a:ext uri="{FF2B5EF4-FFF2-40B4-BE49-F238E27FC236}">
+                <a16:creationId xmlns:a16="http://schemas.microsoft.com/office/drawing/2014/main" id="{4E105FD9-AEC7-4C13-AFD6-251110CE9306}"/>
+              </a:ext>
+            </a:extLst>
+          </p:cNvPr>
+          <p:cNvSpPr>
+            <a:spLocks noGrp="1"/>
+          </p:cNvSpPr>
+          <p:nvPr>
+            <p:ph type="ftr" sz="quarter" idx="3"/>
+          </p:nvPr>
+        </p:nvSpPr>
+        <p:spPr/>
+        <p:txBody>
+          <a:bodyPr/>
+          <a:lstStyle/>
+          <a:p>
+            <a:r>
+              <a:rPr lang="en-US"/>
+              <a:t>© 2021 Software AG. All rights reserved. For internal use only and for Software AG Partners.</a:t>
+            </a:r>
+            <a:endParaRPr lang="en-US" dirty="0"/>
+          </a:p>
+        </p:txBody>
+      </p:sp>
+      <p:sp>
+        <p:nvSpPr>
+          <p:cNvPr id="4" name="Slide Number Placeholder 3">
+            <a:extLst>
+              <a:ext uri="{FF2B5EF4-FFF2-40B4-BE49-F238E27FC236}">
+                <a16:creationId xmlns:a16="http://schemas.microsoft.com/office/drawing/2014/main" id="{F2ACCD61-5A60-4B19-A4BE-34E17BE12F10}"/>
+              </a:ext>
+            </a:extLst>
+          </p:cNvPr>
+          <p:cNvSpPr>
+            <a:spLocks noGrp="1"/>
+          </p:cNvSpPr>
+          <p:nvPr>
+            <p:ph type="sldNum" sz="quarter" idx="4"/>
+          </p:nvPr>
+        </p:nvSpPr>
+        <p:spPr/>
+        <p:txBody>
+          <a:bodyPr/>
+          <a:lstStyle/>
+          <a:p>
+            <a:fld id="{22FF84AA-2C76-4AF1-8502-73D25D47F37C}" type="slidenum">
+              <a:rPr lang="en-US" smtClean="0"/>
+              <a:pPr/>
+              <a:t>6</a:t>
+            </a:fld>
+            <a:endParaRPr lang="en-US" dirty="0"/>
+          </a:p>
+        </p:txBody>
+      </p:sp>
+      <p:sp>
+        <p:nvSpPr>
+          <p:cNvPr id="5" name="Subtitle 4">
+            <a:extLst>
+              <a:ext uri="{FF2B5EF4-FFF2-40B4-BE49-F238E27FC236}">
+                <a16:creationId xmlns:a16="http://schemas.microsoft.com/office/drawing/2014/main" id="{2B2D0D25-80A5-4268-8A45-30C5E3A23BE6}"/>
+              </a:ext>
+            </a:extLst>
+          </p:cNvPr>
+          <p:cNvSpPr>
+            <a:spLocks noGrp="1"/>
+          </p:cNvSpPr>
+          <p:nvPr>
+            <p:ph type="subTitle" sz="quarter" idx="1"/>
+          </p:nvPr>
+        </p:nvSpPr>
+        <p:spPr/>
+        <p:txBody>
+          <a:bodyPr/>
+          <a:lstStyle/>
+          <a:p>
+            <a:r>
+              <a:rPr lang="en-US" dirty="0"/>
+              <a:t>CRUD on Invoices</a:t>
+            </a:r>
+            <a:endParaRPr lang="en-IN" dirty="0"/>
+          </a:p>
+        </p:txBody>
+      </p:sp>
+      <p:sp>
+        <p:nvSpPr>
+          <p:cNvPr id="6" name="Content Placeholder 5">
+            <a:extLst>
+              <a:ext uri="{FF2B5EF4-FFF2-40B4-BE49-F238E27FC236}">
+                <a16:creationId xmlns:a16="http://schemas.microsoft.com/office/drawing/2014/main" id="{3207D638-D150-4C9B-894C-0BB6C5D4EC6F}"/>
+              </a:ext>
+            </a:extLst>
+          </p:cNvPr>
+          <p:cNvSpPr>
+            <a:spLocks noGrp="1"/>
+          </p:cNvSpPr>
+          <p:nvPr>
+            <p:ph sz="quarter" idx="21"/>
+          </p:nvPr>
+        </p:nvSpPr>
+        <p:spPr/>
+        <p:txBody>
+          <a:bodyPr/>
+          <a:lstStyle/>
+          <a:p>
+            <a:r>
+              <a:rPr lang="en-US" dirty="0"/>
+              <a:t>This connector is built with Actions for CRUD operations on Invoices module</a:t>
+            </a:r>
+          </a:p>
+          <a:p>
+            <a:pPr marL="285750" indent="-285750">
+              <a:buFont typeface="Arial" panose="020B0604020202020204" pitchFamily="34" charset="0"/>
+              <a:buChar char="•"/>
+            </a:pPr>
+            <a:r>
+              <a:rPr lang="en-US" dirty="0"/>
+              <a:t>List Invoices</a:t>
+            </a:r>
+          </a:p>
+          <a:p>
+            <a:pPr marL="285750" indent="-285750">
+              <a:buFont typeface="Arial" panose="020B0604020202020204" pitchFamily="34" charset="0"/>
+              <a:buChar char="•"/>
+            </a:pPr>
+            <a:r>
+              <a:rPr lang="en-US" dirty="0"/>
+              <a:t>Get Invoice (for </a:t>
+            </a:r>
+            <a:r>
+              <a:rPr lang="en-US" dirty="0" err="1"/>
+              <a:t>invoice_id</a:t>
+            </a:r>
+            <a:r>
+              <a:rPr lang="en-US" dirty="0"/>
+              <a:t>)</a:t>
+            </a:r>
+          </a:p>
+          <a:p>
+            <a:pPr marL="285750" indent="-285750">
+              <a:buFont typeface="Arial" panose="020B0604020202020204" pitchFamily="34" charset="0"/>
+              <a:buChar char="•"/>
+            </a:pPr>
+            <a:r>
+              <a:rPr lang="en-US" dirty="0"/>
+              <a:t>Create Invoice</a:t>
+            </a:r>
+          </a:p>
+          <a:p>
+            <a:pPr marL="285750" indent="-285750">
+              <a:buFont typeface="Arial" panose="020B0604020202020204" pitchFamily="34" charset="0"/>
+              <a:buChar char="•"/>
+            </a:pPr>
+            <a:r>
+              <a:rPr lang="en-US" dirty="0"/>
+              <a:t>Update Invoice</a:t>
+            </a:r>
+          </a:p>
+          <a:p>
+            <a:pPr marL="285750" indent="-285750">
+              <a:buFont typeface="Arial" panose="020B0604020202020204" pitchFamily="34" charset="0"/>
+              <a:buChar char="•"/>
+            </a:pPr>
+            <a:r>
+              <a:rPr lang="en-US" dirty="0"/>
+              <a:t>Delete Invoice</a:t>
+            </a:r>
+            <a:endParaRPr lang="en-IN" dirty="0"/>
+          </a:p>
+        </p:txBody>
+      </p:sp>
+      <p:pic>
+        <p:nvPicPr>
+          <p:cNvPr id="8" name="Picture 7">
+            <a:extLst>
+              <a:ext uri="{FF2B5EF4-FFF2-40B4-BE49-F238E27FC236}">
+                <a16:creationId xmlns:a16="http://schemas.microsoft.com/office/drawing/2014/main" id="{02AAE27F-16FB-46C7-8442-8A1D46578F4A}"/>
+              </a:ext>
+            </a:extLst>
+          </p:cNvPr>
+          <p:cNvPicPr>
+            <a:picLocks noChangeAspect="1"/>
+          </p:cNvPicPr>
+          <p:nvPr/>
+        </p:nvPicPr>
+        <p:blipFill>
+          <a:blip r:embed="rId2"/>
+          <a:stretch>
+            <a:fillRect/>
+          </a:stretch>
+        </p:blipFill>
+        <p:spPr>
+          <a:xfrm>
+            <a:off x="4945429" y="2132856"/>
+            <a:ext cx="6883871" cy="3814877"/>
+          </a:xfrm>
+          <a:prstGeom prst="rect">
+            <a:avLst/>
+          </a:prstGeom>
+        </p:spPr>
+      </p:pic>
+    </p:spTree>
+    <p:extLst>
+      <p:ext uri="{BB962C8B-B14F-4D97-AF65-F5344CB8AC3E}">
+        <p14:creationId xmlns:p14="http://schemas.microsoft.com/office/powerpoint/2010/main" val="1865612321"/>
+      </p:ext>
+    </p:extLst>
+  </p:cSld>
+  <p:clrMapOvr>
+    <a:masterClrMapping/>
+  </p:clrMapOvr>
+</p:sld>
+</file>
+
+<file path=ppt/slides/slide7.xml><?xml version="1.0" encoding="utf-8"?>
 <p:sld xmlns:a="http://schemas.openxmlformats.org/drawingml/2006/main" xmlns:r="http://schemas.openxmlformats.org/officeDocument/2006/relationships" xmlns:p="http://schemas.openxmlformats.org/presentationml/2006/main">
   <p:cSld>
     <p:spTree>
@@ -34154,7 +36127,7 @@
             <a:fld id="{22FF84AA-2C76-4AF1-8502-73D25D47F37C}" type="slidenum">
               <a:rPr lang="en-US" smtClean="0"/>
               <a:pPr/>
-              <a:t>3</a:t>
+              <a:t>7</a:t>
             </a:fld>
             <a:endParaRPr lang="en-US" dirty="0"/>
           </a:p>
@@ -34231,7 +36204,7 @@
 </p:sld>
 </file>
 
-<file path=ppt/slides/slide4.xml><?xml version="1.0" encoding="utf-8"?>
+<file path=ppt/slides/slide8.xml><?xml version="1.0" encoding="utf-8"?>
 <p:sld xmlns:a="http://schemas.openxmlformats.org/drawingml/2006/main" xmlns:r="http://schemas.openxmlformats.org/officeDocument/2006/relationships" xmlns:p="http://schemas.openxmlformats.org/presentationml/2006/main">
   <p:cSld>
     <p:spTree>
@@ -34328,7 +36301,7 @@
                   <a:spcPts val="600"/>
                 </a:spcAft>
               </a:pPr>
-              <a:t>4</a:t>
+              <a:t>8</a:t>
             </a:fld>
             <a:endParaRPr lang="en-US"/>
           </a:p>
@@ -34571,7 +36544,7 @@
 </p:sld>
 </file>
 
-<file path=ppt/slides/slide5.xml><?xml version="1.0" encoding="utf-8"?>
+<file path=ppt/slides/slide9.xml><?xml version="1.0" encoding="utf-8"?>
 <p:sld xmlns:a="http://schemas.openxmlformats.org/drawingml/2006/main" xmlns:r="http://schemas.openxmlformats.org/officeDocument/2006/relationships" xmlns:p="http://schemas.openxmlformats.org/presentationml/2006/main">
   <p:cSld>
     <p:spTree>
@@ -34641,7 +36614,7 @@
             <a:fld id="{22FF84AA-2C76-4AF1-8502-73D25D47F37C}" type="slidenum">
               <a:rPr lang="en-US" smtClean="0"/>
               <a:pPr/>
-              <a:t>5</a:t>
+              <a:t>9</a:t>
             </a:fld>
             <a:endParaRPr lang="en-US" dirty="0"/>
           </a:p>
@@ -34869,993 +36842,6 @@
     <p:extLst>
       <p:ext uri="{BB962C8B-B14F-4D97-AF65-F5344CB8AC3E}">
         <p14:creationId xmlns:p14="http://schemas.microsoft.com/office/powerpoint/2010/main" val="3330116080"/>
-      </p:ext>
-    </p:extLst>
-  </p:cSld>
-  <p:clrMapOvr>
-    <a:masterClrMapping/>
-  </p:clrMapOvr>
-</p:sld>
-</file>
-
-<file path=ppt/slides/slide6.xml><?xml version="1.0" encoding="utf-8"?>
-<p:sld xmlns:a="http://schemas.openxmlformats.org/drawingml/2006/main" xmlns:r="http://schemas.openxmlformats.org/officeDocument/2006/relationships" xmlns:p="http://schemas.openxmlformats.org/presentationml/2006/main">
-  <p:cSld>
-    <p:spTree>
-      <p:nvGrpSpPr>
-        <p:cNvPr id="1" name=""/>
-        <p:cNvGrpSpPr/>
-        <p:nvPr/>
-      </p:nvGrpSpPr>
-      <p:grpSpPr>
-        <a:xfrm>
-          <a:off x="0" y="0"/>
-          <a:ext cx="0" cy="0"/>
-          <a:chOff x="0" y="0"/>
-          <a:chExt cx="0" cy="0"/>
-        </a:xfrm>
-      </p:grpSpPr>
-      <p:sp>
-        <p:nvSpPr>
-          <p:cNvPr id="2" name="Footer Placeholder 1">
-            <a:extLst>
-              <a:ext uri="{FF2B5EF4-FFF2-40B4-BE49-F238E27FC236}">
-                <a16:creationId xmlns:a16="http://schemas.microsoft.com/office/drawing/2014/main" id="{1D086587-FFCE-405F-BDA1-ADE1411A94F0}"/>
-              </a:ext>
-            </a:extLst>
-          </p:cNvPr>
-          <p:cNvSpPr>
-            <a:spLocks noGrp="1"/>
-          </p:cNvSpPr>
-          <p:nvPr>
-            <p:ph type="ftr" sz="quarter" idx="3"/>
-          </p:nvPr>
-        </p:nvSpPr>
-        <p:spPr/>
-        <p:txBody>
-          <a:bodyPr/>
-          <a:lstStyle/>
-          <a:p>
-            <a:r>
-              <a:rPr lang="en-US"/>
-              <a:t>© 2021 Software AG. All rights reserved. For internal use only and for Software AG Partners.</a:t>
-            </a:r>
-            <a:endParaRPr lang="en-US" dirty="0"/>
-          </a:p>
-        </p:txBody>
-      </p:sp>
-      <p:sp>
-        <p:nvSpPr>
-          <p:cNvPr id="3" name="Slide Number Placeholder 2">
-            <a:extLst>
-              <a:ext uri="{FF2B5EF4-FFF2-40B4-BE49-F238E27FC236}">
-                <a16:creationId xmlns:a16="http://schemas.microsoft.com/office/drawing/2014/main" id="{DFB1FAC4-6E35-40F6-BCDE-674A7CBD420A}"/>
-              </a:ext>
-            </a:extLst>
-          </p:cNvPr>
-          <p:cNvSpPr>
-            <a:spLocks noGrp="1"/>
-          </p:cNvSpPr>
-          <p:nvPr>
-            <p:ph type="sldNum" sz="quarter" idx="4"/>
-          </p:nvPr>
-        </p:nvSpPr>
-        <p:spPr/>
-        <p:txBody>
-          <a:bodyPr/>
-          <a:lstStyle/>
-          <a:p>
-            <a:fld id="{22FF84AA-2C76-4AF1-8502-73D25D47F37C}" type="slidenum">
-              <a:rPr lang="en-US" smtClean="0"/>
-              <a:pPr/>
-              <a:t>6</a:t>
-            </a:fld>
-            <a:endParaRPr lang="en-US" dirty="0"/>
-          </a:p>
-        </p:txBody>
-      </p:sp>
-      <p:sp>
-        <p:nvSpPr>
-          <p:cNvPr id="4" name="Title 3">
-            <a:extLst>
-              <a:ext uri="{FF2B5EF4-FFF2-40B4-BE49-F238E27FC236}">
-                <a16:creationId xmlns:a16="http://schemas.microsoft.com/office/drawing/2014/main" id="{C8E5B66F-5A0C-4C10-A242-AC941064039C}"/>
-              </a:ext>
-            </a:extLst>
-          </p:cNvPr>
-          <p:cNvSpPr>
-            <a:spLocks noGrp="1"/>
-          </p:cNvSpPr>
-          <p:nvPr>
-            <p:ph type="title"/>
-          </p:nvPr>
-        </p:nvSpPr>
-        <p:spPr/>
-        <p:txBody>
-          <a:bodyPr/>
-          <a:lstStyle/>
-          <a:p>
-            <a:r>
-              <a:rPr lang="en-US" dirty="0"/>
-              <a:t>Create Invoice</a:t>
-            </a:r>
-            <a:endParaRPr lang="en-IN" dirty="0"/>
-          </a:p>
-        </p:txBody>
-      </p:sp>
-      <p:sp>
-        <p:nvSpPr>
-          <p:cNvPr id="5" name="Subtitle 4">
-            <a:extLst>
-              <a:ext uri="{FF2B5EF4-FFF2-40B4-BE49-F238E27FC236}">
-                <a16:creationId xmlns:a16="http://schemas.microsoft.com/office/drawing/2014/main" id="{4F442423-B1E1-4750-89BA-CCF925BA4ADA}"/>
-              </a:ext>
-            </a:extLst>
-          </p:cNvPr>
-          <p:cNvSpPr>
-            <a:spLocks noGrp="1"/>
-          </p:cNvSpPr>
-          <p:nvPr>
-            <p:ph type="subTitle" sz="quarter" idx="1"/>
-          </p:nvPr>
-        </p:nvSpPr>
-        <p:spPr/>
-        <p:txBody>
-          <a:bodyPr/>
-          <a:lstStyle/>
-          <a:p>
-            <a:r>
-              <a:rPr lang="en-US" dirty="0"/>
-              <a:t>Flow and Input</a:t>
-            </a:r>
-            <a:endParaRPr lang="en-IN" dirty="0"/>
-          </a:p>
-        </p:txBody>
-      </p:sp>
-      <p:sp>
-        <p:nvSpPr>
-          <p:cNvPr id="6" name="Text Placeholder 5">
-            <a:extLst>
-              <a:ext uri="{FF2B5EF4-FFF2-40B4-BE49-F238E27FC236}">
-                <a16:creationId xmlns:a16="http://schemas.microsoft.com/office/drawing/2014/main" id="{7149F0F6-3E4C-43AA-8AAC-028DFE50D036}"/>
-              </a:ext>
-            </a:extLst>
-          </p:cNvPr>
-          <p:cNvSpPr>
-            <a:spLocks noGrp="1"/>
-          </p:cNvSpPr>
-          <p:nvPr>
-            <p:ph type="body" sz="quarter" idx="11"/>
-          </p:nvPr>
-        </p:nvSpPr>
-        <p:spPr/>
-        <p:txBody>
-          <a:bodyPr/>
-          <a:lstStyle/>
-          <a:p>
-            <a:endParaRPr lang="en-IN"/>
-          </a:p>
-        </p:txBody>
-      </p:sp>
-      <p:sp>
-        <p:nvSpPr>
-          <p:cNvPr id="7" name="Text Placeholder 6">
-            <a:extLst>
-              <a:ext uri="{FF2B5EF4-FFF2-40B4-BE49-F238E27FC236}">
-                <a16:creationId xmlns:a16="http://schemas.microsoft.com/office/drawing/2014/main" id="{B5A43AC2-F730-42CF-AE9D-FDE3909189B2}"/>
-              </a:ext>
-            </a:extLst>
-          </p:cNvPr>
-          <p:cNvSpPr>
-            <a:spLocks noGrp="1"/>
-          </p:cNvSpPr>
-          <p:nvPr>
-            <p:ph type="body" sz="quarter" idx="12"/>
-          </p:nvPr>
-        </p:nvSpPr>
-        <p:spPr/>
-        <p:txBody>
-          <a:bodyPr/>
-          <a:lstStyle/>
-          <a:p>
-            <a:endParaRPr lang="en-IN"/>
-          </a:p>
-        </p:txBody>
-      </p:sp>
-      <p:pic>
-        <p:nvPicPr>
-          <p:cNvPr id="11" name="Content Placeholder 10">
-            <a:extLst>
-              <a:ext uri="{FF2B5EF4-FFF2-40B4-BE49-F238E27FC236}">
-                <a16:creationId xmlns:a16="http://schemas.microsoft.com/office/drawing/2014/main" id="{396A9174-8E4F-4118-A1AB-DFBE35F6206E}"/>
-              </a:ext>
-            </a:extLst>
-          </p:cNvPr>
-          <p:cNvPicPr>
-            <a:picLocks noGrp="1" noChangeAspect="1"/>
-          </p:cNvPicPr>
-          <p:nvPr>
-            <p:ph sz="quarter" idx="21"/>
-          </p:nvPr>
-        </p:nvPicPr>
-        <p:blipFill>
-          <a:blip r:embed="rId2"/>
-          <a:stretch>
-            <a:fillRect/>
-          </a:stretch>
-        </p:blipFill>
-        <p:spPr>
-          <a:xfrm>
-            <a:off x="282240" y="1371921"/>
-            <a:ext cx="5795132" cy="3265661"/>
-          </a:xfrm>
-        </p:spPr>
-      </p:pic>
-      <p:sp>
-        <p:nvSpPr>
-          <p:cNvPr id="9" name="Content Placeholder 8">
-            <a:extLst>
-              <a:ext uri="{FF2B5EF4-FFF2-40B4-BE49-F238E27FC236}">
-                <a16:creationId xmlns:a16="http://schemas.microsoft.com/office/drawing/2014/main" id="{432F783C-FF7F-4360-B358-81B58FBD3B20}"/>
-              </a:ext>
-            </a:extLst>
-          </p:cNvPr>
-          <p:cNvSpPr>
-            <a:spLocks noGrp="1"/>
-          </p:cNvSpPr>
-          <p:nvPr>
-            <p:ph sz="quarter" idx="22"/>
-          </p:nvPr>
-        </p:nvSpPr>
-        <p:spPr/>
-        <p:txBody>
-          <a:bodyPr/>
-          <a:lstStyle/>
-          <a:p>
-            <a:endParaRPr lang="en-IN"/>
-          </a:p>
-        </p:txBody>
-      </p:sp>
-      <p:pic>
-        <p:nvPicPr>
-          <p:cNvPr id="13" name="Picture 12">
-            <a:extLst>
-              <a:ext uri="{FF2B5EF4-FFF2-40B4-BE49-F238E27FC236}">
-                <a16:creationId xmlns:a16="http://schemas.microsoft.com/office/drawing/2014/main" id="{061D8C08-AAFE-4DF0-9F15-BEBDAB618AA6}"/>
-              </a:ext>
-            </a:extLst>
-          </p:cNvPr>
-          <p:cNvPicPr>
-            <a:picLocks noChangeAspect="1"/>
-          </p:cNvPicPr>
-          <p:nvPr/>
-        </p:nvPicPr>
-        <p:blipFill>
-          <a:blip r:embed="rId3"/>
-          <a:stretch>
-            <a:fillRect/>
-          </a:stretch>
-        </p:blipFill>
-        <p:spPr>
-          <a:xfrm>
-            <a:off x="6193200" y="1358613"/>
-            <a:ext cx="5637213" cy="3174354"/>
-          </a:xfrm>
-          <a:prstGeom prst="rect">
-            <a:avLst/>
-          </a:prstGeom>
-        </p:spPr>
-      </p:pic>
-    </p:spTree>
-    <p:extLst>
-      <p:ext uri="{BB962C8B-B14F-4D97-AF65-F5344CB8AC3E}">
-        <p14:creationId xmlns:p14="http://schemas.microsoft.com/office/powerpoint/2010/main" val="1569880048"/>
-      </p:ext>
-    </p:extLst>
-  </p:cSld>
-  <p:clrMapOvr>
-    <a:masterClrMapping/>
-  </p:clrMapOvr>
-</p:sld>
-</file>
-
-<file path=ppt/slides/slide7.xml><?xml version="1.0" encoding="utf-8"?>
-<p:sld xmlns:a="http://schemas.openxmlformats.org/drawingml/2006/main" xmlns:r="http://schemas.openxmlformats.org/officeDocument/2006/relationships" xmlns:p="http://schemas.openxmlformats.org/presentationml/2006/main">
-  <p:cSld>
-    <p:spTree>
-      <p:nvGrpSpPr>
-        <p:cNvPr id="1" name=""/>
-        <p:cNvGrpSpPr/>
-        <p:nvPr/>
-      </p:nvGrpSpPr>
-      <p:grpSpPr>
-        <a:xfrm>
-          <a:off x="0" y="0"/>
-          <a:ext cx="0" cy="0"/>
-          <a:chOff x="0" y="0"/>
-          <a:chExt cx="0" cy="0"/>
-        </a:xfrm>
-      </p:grpSpPr>
-      <p:sp>
-        <p:nvSpPr>
-          <p:cNvPr id="2" name="Footer Placeholder 1">
-            <a:extLst>
-              <a:ext uri="{FF2B5EF4-FFF2-40B4-BE49-F238E27FC236}">
-                <a16:creationId xmlns:a16="http://schemas.microsoft.com/office/drawing/2014/main" id="{C85C66DA-D497-4B35-8AA5-EE62928014BD}"/>
-              </a:ext>
-            </a:extLst>
-          </p:cNvPr>
-          <p:cNvSpPr>
-            <a:spLocks noGrp="1"/>
-          </p:cNvSpPr>
-          <p:nvPr>
-            <p:ph type="ftr" sz="quarter" idx="3"/>
-          </p:nvPr>
-        </p:nvSpPr>
-        <p:spPr/>
-        <p:txBody>
-          <a:bodyPr/>
-          <a:lstStyle/>
-          <a:p>
-            <a:r>
-              <a:rPr lang="en-US"/>
-              <a:t>© 2021 Software AG. All rights reserved. For internal use only and for Software AG Partners.</a:t>
-            </a:r>
-            <a:endParaRPr lang="en-US" dirty="0"/>
-          </a:p>
-        </p:txBody>
-      </p:sp>
-      <p:sp>
-        <p:nvSpPr>
-          <p:cNvPr id="3" name="Slide Number Placeholder 2">
-            <a:extLst>
-              <a:ext uri="{FF2B5EF4-FFF2-40B4-BE49-F238E27FC236}">
-                <a16:creationId xmlns:a16="http://schemas.microsoft.com/office/drawing/2014/main" id="{03E796A8-5AF6-4D13-91CD-89A8EC1F5142}"/>
-              </a:ext>
-            </a:extLst>
-          </p:cNvPr>
-          <p:cNvSpPr>
-            <a:spLocks noGrp="1"/>
-          </p:cNvSpPr>
-          <p:nvPr>
-            <p:ph type="sldNum" sz="quarter" idx="4"/>
-          </p:nvPr>
-        </p:nvSpPr>
-        <p:spPr/>
-        <p:txBody>
-          <a:bodyPr/>
-          <a:lstStyle/>
-          <a:p>
-            <a:fld id="{22FF84AA-2C76-4AF1-8502-73D25D47F37C}" type="slidenum">
-              <a:rPr lang="en-US" smtClean="0"/>
-              <a:pPr/>
-              <a:t>7</a:t>
-            </a:fld>
-            <a:endParaRPr lang="en-US" dirty="0"/>
-          </a:p>
-        </p:txBody>
-      </p:sp>
-      <p:sp>
-        <p:nvSpPr>
-          <p:cNvPr id="4" name="Title 3">
-            <a:extLst>
-              <a:ext uri="{FF2B5EF4-FFF2-40B4-BE49-F238E27FC236}">
-                <a16:creationId xmlns:a16="http://schemas.microsoft.com/office/drawing/2014/main" id="{45B32D6E-4A34-4256-A03D-95B85239C376}"/>
-              </a:ext>
-            </a:extLst>
-          </p:cNvPr>
-          <p:cNvSpPr>
-            <a:spLocks noGrp="1"/>
-          </p:cNvSpPr>
-          <p:nvPr>
-            <p:ph type="title"/>
-          </p:nvPr>
-        </p:nvSpPr>
-        <p:spPr/>
-        <p:txBody>
-          <a:bodyPr/>
-          <a:lstStyle/>
-          <a:p>
-            <a:r>
-              <a:rPr lang="en-US" dirty="0"/>
-              <a:t>Update Invoice</a:t>
-            </a:r>
-            <a:endParaRPr lang="en-IN" dirty="0"/>
-          </a:p>
-        </p:txBody>
-      </p:sp>
-      <p:sp>
-        <p:nvSpPr>
-          <p:cNvPr id="5" name="Subtitle 4">
-            <a:extLst>
-              <a:ext uri="{FF2B5EF4-FFF2-40B4-BE49-F238E27FC236}">
-                <a16:creationId xmlns:a16="http://schemas.microsoft.com/office/drawing/2014/main" id="{76B78CC1-62C3-45BE-8A6A-A660399ADB03}"/>
-              </a:ext>
-            </a:extLst>
-          </p:cNvPr>
-          <p:cNvSpPr>
-            <a:spLocks noGrp="1"/>
-          </p:cNvSpPr>
-          <p:nvPr>
-            <p:ph type="subTitle" sz="quarter" idx="1"/>
-          </p:nvPr>
-        </p:nvSpPr>
-        <p:spPr/>
-        <p:txBody>
-          <a:bodyPr/>
-          <a:lstStyle/>
-          <a:p>
-            <a:r>
-              <a:rPr lang="en-US" dirty="0"/>
-              <a:t>Input pipeline and output</a:t>
-            </a:r>
-            <a:endParaRPr lang="en-IN" dirty="0"/>
-          </a:p>
-        </p:txBody>
-      </p:sp>
-      <p:sp>
-        <p:nvSpPr>
-          <p:cNvPr id="6" name="Text Placeholder 5">
-            <a:extLst>
-              <a:ext uri="{FF2B5EF4-FFF2-40B4-BE49-F238E27FC236}">
-                <a16:creationId xmlns:a16="http://schemas.microsoft.com/office/drawing/2014/main" id="{425763C2-FFB9-41FA-B848-0818DE275CB3}"/>
-              </a:ext>
-            </a:extLst>
-          </p:cNvPr>
-          <p:cNvSpPr>
-            <a:spLocks noGrp="1"/>
-          </p:cNvSpPr>
-          <p:nvPr>
-            <p:ph type="body" sz="quarter" idx="11"/>
-          </p:nvPr>
-        </p:nvSpPr>
-        <p:spPr/>
-        <p:txBody>
-          <a:bodyPr/>
-          <a:lstStyle/>
-          <a:p>
-            <a:endParaRPr lang="en-IN"/>
-          </a:p>
-        </p:txBody>
-      </p:sp>
-      <p:sp>
-        <p:nvSpPr>
-          <p:cNvPr id="7" name="Text Placeholder 6">
-            <a:extLst>
-              <a:ext uri="{FF2B5EF4-FFF2-40B4-BE49-F238E27FC236}">
-                <a16:creationId xmlns:a16="http://schemas.microsoft.com/office/drawing/2014/main" id="{D6F442F8-4C72-4AA7-A271-DEF3FD8D5054}"/>
-              </a:ext>
-            </a:extLst>
-          </p:cNvPr>
-          <p:cNvSpPr>
-            <a:spLocks noGrp="1"/>
-          </p:cNvSpPr>
-          <p:nvPr>
-            <p:ph type="body" sz="quarter" idx="12"/>
-          </p:nvPr>
-        </p:nvSpPr>
-        <p:spPr/>
-        <p:txBody>
-          <a:bodyPr/>
-          <a:lstStyle/>
-          <a:p>
-            <a:endParaRPr lang="en-IN" dirty="0"/>
-          </a:p>
-        </p:txBody>
-      </p:sp>
-      <p:sp>
-        <p:nvSpPr>
-          <p:cNvPr id="8" name="Content Placeholder 7">
-            <a:extLst>
-              <a:ext uri="{FF2B5EF4-FFF2-40B4-BE49-F238E27FC236}">
-                <a16:creationId xmlns:a16="http://schemas.microsoft.com/office/drawing/2014/main" id="{6823FC9E-C3B4-4D87-B443-9B357C22CD8D}"/>
-              </a:ext>
-            </a:extLst>
-          </p:cNvPr>
-          <p:cNvSpPr>
-            <a:spLocks noGrp="1"/>
-          </p:cNvSpPr>
-          <p:nvPr>
-            <p:ph sz="quarter" idx="21"/>
-          </p:nvPr>
-        </p:nvSpPr>
-        <p:spPr/>
-        <p:txBody>
-          <a:bodyPr/>
-          <a:lstStyle/>
-          <a:p>
-            <a:endParaRPr lang="en-IN"/>
-          </a:p>
-        </p:txBody>
-      </p:sp>
-      <p:sp>
-        <p:nvSpPr>
-          <p:cNvPr id="9" name="Content Placeholder 8">
-            <a:extLst>
-              <a:ext uri="{FF2B5EF4-FFF2-40B4-BE49-F238E27FC236}">
-                <a16:creationId xmlns:a16="http://schemas.microsoft.com/office/drawing/2014/main" id="{24A9B38E-71D1-47BD-B50D-465B7EACD5FA}"/>
-              </a:ext>
-            </a:extLst>
-          </p:cNvPr>
-          <p:cNvSpPr>
-            <a:spLocks noGrp="1"/>
-          </p:cNvSpPr>
-          <p:nvPr>
-            <p:ph sz="quarter" idx="22"/>
-          </p:nvPr>
-        </p:nvSpPr>
-        <p:spPr/>
-        <p:txBody>
-          <a:bodyPr/>
-          <a:lstStyle/>
-          <a:p>
-            <a:endParaRPr lang="en-IN"/>
-          </a:p>
-        </p:txBody>
-      </p:sp>
-      <p:pic>
-        <p:nvPicPr>
-          <p:cNvPr id="11" name="Picture 10">
-            <a:extLst>
-              <a:ext uri="{FF2B5EF4-FFF2-40B4-BE49-F238E27FC236}">
-                <a16:creationId xmlns:a16="http://schemas.microsoft.com/office/drawing/2014/main" id="{BE146A15-97AC-43BE-AF54-8033BFCCE8E2}"/>
-              </a:ext>
-            </a:extLst>
-          </p:cNvPr>
-          <p:cNvPicPr>
-            <a:picLocks noChangeAspect="1"/>
-          </p:cNvPicPr>
-          <p:nvPr/>
-        </p:nvPicPr>
-        <p:blipFill>
-          <a:blip r:embed="rId2"/>
-          <a:stretch>
-            <a:fillRect/>
-          </a:stretch>
-        </p:blipFill>
-        <p:spPr>
-          <a:xfrm>
-            <a:off x="6193200" y="1129330"/>
-            <a:ext cx="5735811" cy="3077752"/>
-          </a:xfrm>
-          <a:prstGeom prst="rect">
-            <a:avLst/>
-          </a:prstGeom>
-        </p:spPr>
-      </p:pic>
-      <p:pic>
-        <p:nvPicPr>
-          <p:cNvPr id="15" name="Picture 14">
-            <a:extLst>
-              <a:ext uri="{FF2B5EF4-FFF2-40B4-BE49-F238E27FC236}">
-                <a16:creationId xmlns:a16="http://schemas.microsoft.com/office/drawing/2014/main" id="{3273CC32-1FDA-4C54-9DDF-FDF8C4368051}"/>
-              </a:ext>
-            </a:extLst>
-          </p:cNvPr>
-          <p:cNvPicPr>
-            <a:picLocks noChangeAspect="1"/>
-          </p:cNvPicPr>
-          <p:nvPr/>
-        </p:nvPicPr>
-        <p:blipFill>
-          <a:blip r:embed="rId3"/>
-          <a:stretch>
-            <a:fillRect/>
-          </a:stretch>
-        </p:blipFill>
-        <p:spPr>
-          <a:xfrm>
-            <a:off x="505700" y="2378515"/>
-            <a:ext cx="5542012" cy="733502"/>
-          </a:xfrm>
-          <a:prstGeom prst="rect">
-            <a:avLst/>
-          </a:prstGeom>
-        </p:spPr>
-      </p:pic>
-    </p:spTree>
-    <p:extLst>
-      <p:ext uri="{BB962C8B-B14F-4D97-AF65-F5344CB8AC3E}">
-        <p14:creationId xmlns:p14="http://schemas.microsoft.com/office/powerpoint/2010/main" val="847056297"/>
-      </p:ext>
-    </p:extLst>
-  </p:cSld>
-  <p:clrMapOvr>
-    <a:masterClrMapping/>
-  </p:clrMapOvr>
-</p:sld>
-</file>
-
-<file path=ppt/slides/slide8.xml><?xml version="1.0" encoding="utf-8"?>
-<p:sld xmlns:a="http://schemas.openxmlformats.org/drawingml/2006/main" xmlns:r="http://schemas.openxmlformats.org/officeDocument/2006/relationships" xmlns:p="http://schemas.openxmlformats.org/presentationml/2006/main">
-  <p:cSld>
-    <p:spTree>
-      <p:nvGrpSpPr>
-        <p:cNvPr id="1" name=""/>
-        <p:cNvGrpSpPr/>
-        <p:nvPr/>
-      </p:nvGrpSpPr>
-      <p:grpSpPr>
-        <a:xfrm>
-          <a:off x="0" y="0"/>
-          <a:ext cx="0" cy="0"/>
-          <a:chOff x="0" y="0"/>
-          <a:chExt cx="0" cy="0"/>
-        </a:xfrm>
-      </p:grpSpPr>
-      <p:sp>
-        <p:nvSpPr>
-          <p:cNvPr id="2" name="Footer Placeholder 1">
-            <a:extLst>
-              <a:ext uri="{FF2B5EF4-FFF2-40B4-BE49-F238E27FC236}">
-                <a16:creationId xmlns:a16="http://schemas.microsoft.com/office/drawing/2014/main" id="{34E94CBD-179C-4B63-A651-8A502FA9D87C}"/>
-              </a:ext>
-            </a:extLst>
-          </p:cNvPr>
-          <p:cNvSpPr>
-            <a:spLocks noGrp="1"/>
-          </p:cNvSpPr>
-          <p:nvPr>
-            <p:ph type="ftr" sz="quarter" idx="3"/>
-          </p:nvPr>
-        </p:nvSpPr>
-        <p:spPr/>
-        <p:txBody>
-          <a:bodyPr/>
-          <a:lstStyle/>
-          <a:p>
-            <a:r>
-              <a:rPr lang="en-US"/>
-              <a:t>© 2021 Software AG. All rights reserved. For internal use only and for Software AG Partners.</a:t>
-            </a:r>
-            <a:endParaRPr lang="en-US" dirty="0"/>
-          </a:p>
-        </p:txBody>
-      </p:sp>
-      <p:sp>
-        <p:nvSpPr>
-          <p:cNvPr id="3" name="Slide Number Placeholder 2">
-            <a:extLst>
-              <a:ext uri="{FF2B5EF4-FFF2-40B4-BE49-F238E27FC236}">
-                <a16:creationId xmlns:a16="http://schemas.microsoft.com/office/drawing/2014/main" id="{6D51A362-C750-4486-A87A-2F397DC206A0}"/>
-              </a:ext>
-            </a:extLst>
-          </p:cNvPr>
-          <p:cNvSpPr>
-            <a:spLocks noGrp="1"/>
-          </p:cNvSpPr>
-          <p:nvPr>
-            <p:ph type="sldNum" sz="quarter" idx="4"/>
-          </p:nvPr>
-        </p:nvSpPr>
-        <p:spPr/>
-        <p:txBody>
-          <a:bodyPr/>
-          <a:lstStyle/>
-          <a:p>
-            <a:fld id="{22FF84AA-2C76-4AF1-8502-73D25D47F37C}" type="slidenum">
-              <a:rPr lang="en-US" smtClean="0"/>
-              <a:pPr/>
-              <a:t>8</a:t>
-            </a:fld>
-            <a:endParaRPr lang="en-US" dirty="0"/>
-          </a:p>
-        </p:txBody>
-      </p:sp>
-      <p:sp>
-        <p:nvSpPr>
-          <p:cNvPr id="4" name="Title 3">
-            <a:extLst>
-              <a:ext uri="{FF2B5EF4-FFF2-40B4-BE49-F238E27FC236}">
-                <a16:creationId xmlns:a16="http://schemas.microsoft.com/office/drawing/2014/main" id="{7C539F9D-13A5-40E3-BA1D-5B28DEB9BE65}"/>
-              </a:ext>
-            </a:extLst>
-          </p:cNvPr>
-          <p:cNvSpPr>
-            <a:spLocks noGrp="1"/>
-          </p:cNvSpPr>
-          <p:nvPr>
-            <p:ph type="title"/>
-          </p:nvPr>
-        </p:nvSpPr>
-        <p:spPr/>
-        <p:txBody>
-          <a:bodyPr/>
-          <a:lstStyle/>
-          <a:p>
-            <a:r>
-              <a:rPr lang="en-US" dirty="0"/>
-              <a:t>Delete Invoice</a:t>
-            </a:r>
-            <a:endParaRPr lang="en-IN" dirty="0"/>
-          </a:p>
-        </p:txBody>
-      </p:sp>
-      <p:sp>
-        <p:nvSpPr>
-          <p:cNvPr id="5" name="Subtitle 4">
-            <a:extLst>
-              <a:ext uri="{FF2B5EF4-FFF2-40B4-BE49-F238E27FC236}">
-                <a16:creationId xmlns:a16="http://schemas.microsoft.com/office/drawing/2014/main" id="{51A35CAE-2202-4C2C-94D3-981223967F21}"/>
-              </a:ext>
-            </a:extLst>
-          </p:cNvPr>
-          <p:cNvSpPr>
-            <a:spLocks noGrp="1"/>
-          </p:cNvSpPr>
-          <p:nvPr>
-            <p:ph type="subTitle" sz="quarter" idx="1"/>
-          </p:nvPr>
-        </p:nvSpPr>
-        <p:spPr/>
-        <p:txBody>
-          <a:bodyPr/>
-          <a:lstStyle/>
-          <a:p>
-            <a:r>
-              <a:rPr lang="en-US" dirty="0"/>
-              <a:t>Input pipeline and output</a:t>
-            </a:r>
-            <a:endParaRPr lang="en-IN" dirty="0"/>
-          </a:p>
-          <a:p>
-            <a:endParaRPr lang="en-IN" dirty="0"/>
-          </a:p>
-        </p:txBody>
-      </p:sp>
-      <p:sp>
-        <p:nvSpPr>
-          <p:cNvPr id="6" name="Text Placeholder 5">
-            <a:extLst>
-              <a:ext uri="{FF2B5EF4-FFF2-40B4-BE49-F238E27FC236}">
-                <a16:creationId xmlns:a16="http://schemas.microsoft.com/office/drawing/2014/main" id="{3A2C217A-ADDD-4376-8C37-14C6F36BB818}"/>
-              </a:ext>
-            </a:extLst>
-          </p:cNvPr>
-          <p:cNvSpPr>
-            <a:spLocks noGrp="1"/>
-          </p:cNvSpPr>
-          <p:nvPr>
-            <p:ph type="body" sz="quarter" idx="11"/>
-          </p:nvPr>
-        </p:nvSpPr>
-        <p:spPr/>
-        <p:txBody>
-          <a:bodyPr/>
-          <a:lstStyle/>
-          <a:p>
-            <a:endParaRPr lang="en-IN" dirty="0"/>
-          </a:p>
-        </p:txBody>
-      </p:sp>
-      <p:sp>
-        <p:nvSpPr>
-          <p:cNvPr id="7" name="Text Placeholder 6">
-            <a:extLst>
-              <a:ext uri="{FF2B5EF4-FFF2-40B4-BE49-F238E27FC236}">
-                <a16:creationId xmlns:a16="http://schemas.microsoft.com/office/drawing/2014/main" id="{BD6C779A-972E-4E80-9B1B-2D594B34D6F1}"/>
-              </a:ext>
-            </a:extLst>
-          </p:cNvPr>
-          <p:cNvSpPr>
-            <a:spLocks noGrp="1"/>
-          </p:cNvSpPr>
-          <p:nvPr>
-            <p:ph type="body" sz="quarter" idx="12"/>
-          </p:nvPr>
-        </p:nvSpPr>
-        <p:spPr/>
-        <p:txBody>
-          <a:bodyPr/>
-          <a:lstStyle/>
-          <a:p>
-            <a:endParaRPr lang="en-IN"/>
-          </a:p>
-        </p:txBody>
-      </p:sp>
-      <p:sp>
-        <p:nvSpPr>
-          <p:cNvPr id="8" name="Content Placeholder 7">
-            <a:extLst>
-              <a:ext uri="{FF2B5EF4-FFF2-40B4-BE49-F238E27FC236}">
-                <a16:creationId xmlns:a16="http://schemas.microsoft.com/office/drawing/2014/main" id="{EF0FEB76-A479-4F2D-B3C7-71ADCC00F0A5}"/>
-              </a:ext>
-            </a:extLst>
-          </p:cNvPr>
-          <p:cNvSpPr>
-            <a:spLocks noGrp="1"/>
-          </p:cNvSpPr>
-          <p:nvPr>
-            <p:ph sz="quarter" idx="21"/>
-          </p:nvPr>
-        </p:nvSpPr>
-        <p:spPr/>
-        <p:txBody>
-          <a:bodyPr/>
-          <a:lstStyle/>
-          <a:p>
-            <a:endParaRPr lang="en-IN"/>
-          </a:p>
-        </p:txBody>
-      </p:sp>
-      <p:sp>
-        <p:nvSpPr>
-          <p:cNvPr id="9" name="Content Placeholder 8">
-            <a:extLst>
-              <a:ext uri="{FF2B5EF4-FFF2-40B4-BE49-F238E27FC236}">
-                <a16:creationId xmlns:a16="http://schemas.microsoft.com/office/drawing/2014/main" id="{E3963E5F-875E-440C-A29D-EF72A8B490EA}"/>
-              </a:ext>
-            </a:extLst>
-          </p:cNvPr>
-          <p:cNvSpPr>
-            <a:spLocks noGrp="1"/>
-          </p:cNvSpPr>
-          <p:nvPr>
-            <p:ph sz="quarter" idx="22"/>
-          </p:nvPr>
-        </p:nvSpPr>
-        <p:spPr/>
-        <p:txBody>
-          <a:bodyPr/>
-          <a:lstStyle/>
-          <a:p>
-            <a:endParaRPr lang="en-IN"/>
-          </a:p>
-        </p:txBody>
-      </p:sp>
-      <p:pic>
-        <p:nvPicPr>
-          <p:cNvPr id="11" name="Picture 10">
-            <a:extLst>
-              <a:ext uri="{FF2B5EF4-FFF2-40B4-BE49-F238E27FC236}">
-                <a16:creationId xmlns:a16="http://schemas.microsoft.com/office/drawing/2014/main" id="{AAF841F3-7AFA-4219-B37E-229BB4ACA250}"/>
-              </a:ext>
-            </a:extLst>
-          </p:cNvPr>
-          <p:cNvPicPr>
-            <a:picLocks noChangeAspect="1"/>
-          </p:cNvPicPr>
-          <p:nvPr/>
-        </p:nvPicPr>
-        <p:blipFill>
-          <a:blip r:embed="rId2"/>
-          <a:stretch>
-            <a:fillRect/>
-          </a:stretch>
-        </p:blipFill>
-        <p:spPr>
-          <a:xfrm>
-            <a:off x="6095250" y="1988840"/>
-            <a:ext cx="5963312" cy="1721551"/>
-          </a:xfrm>
-          <a:prstGeom prst="rect">
-            <a:avLst/>
-          </a:prstGeom>
-        </p:spPr>
-      </p:pic>
-      <p:pic>
-        <p:nvPicPr>
-          <p:cNvPr id="13" name="Picture 12">
-            <a:extLst>
-              <a:ext uri="{FF2B5EF4-FFF2-40B4-BE49-F238E27FC236}">
-                <a16:creationId xmlns:a16="http://schemas.microsoft.com/office/drawing/2014/main" id="{3548EB3D-5DE6-46FA-AC98-D5821138CAEC}"/>
-              </a:ext>
-            </a:extLst>
-          </p:cNvPr>
-          <p:cNvPicPr>
-            <a:picLocks noChangeAspect="1"/>
-          </p:cNvPicPr>
-          <p:nvPr/>
-        </p:nvPicPr>
-        <p:blipFill>
-          <a:blip r:embed="rId3"/>
-          <a:stretch>
-            <a:fillRect/>
-          </a:stretch>
-        </p:blipFill>
-        <p:spPr>
-          <a:xfrm>
-            <a:off x="327837" y="1483913"/>
-            <a:ext cx="5637214" cy="2442598"/>
-          </a:xfrm>
-          <a:prstGeom prst="rect">
-            <a:avLst/>
-          </a:prstGeom>
-        </p:spPr>
-      </p:pic>
-    </p:spTree>
-    <p:extLst>
-      <p:ext uri="{BB962C8B-B14F-4D97-AF65-F5344CB8AC3E}">
-        <p14:creationId xmlns:p14="http://schemas.microsoft.com/office/powerpoint/2010/main" val="2464069141"/>
-      </p:ext>
-    </p:extLst>
-  </p:cSld>
-  <p:clrMapOvr>
-    <a:masterClrMapping/>
-  </p:clrMapOvr>
-</p:sld>
-</file>
-
-<file path=ppt/slides/slide9.xml><?xml version="1.0" encoding="utf-8"?>
-<p:sld xmlns:a="http://schemas.openxmlformats.org/drawingml/2006/main" xmlns:r="http://schemas.openxmlformats.org/officeDocument/2006/relationships" xmlns:p="http://schemas.openxmlformats.org/presentationml/2006/main">
-  <p:cSld>
-    <p:spTree>
-      <p:nvGrpSpPr>
-        <p:cNvPr id="1" name=""/>
-        <p:cNvGrpSpPr/>
-        <p:nvPr/>
-      </p:nvGrpSpPr>
-      <p:grpSpPr>
-        <a:xfrm>
-          <a:off x="0" y="0"/>
-          <a:ext cx="0" cy="0"/>
-          <a:chOff x="0" y="0"/>
-          <a:chExt cx="0" cy="0"/>
-        </a:xfrm>
-      </p:grpSpPr>
-      <p:sp>
-        <p:nvSpPr>
-          <p:cNvPr id="2" name="Footer Placeholder 1">
-            <a:extLst>
-              <a:ext uri="{FF2B5EF4-FFF2-40B4-BE49-F238E27FC236}">
-                <a16:creationId xmlns:a16="http://schemas.microsoft.com/office/drawing/2014/main" id="{17254AEB-7560-4FDF-83DE-ACEDD50906ED}"/>
-              </a:ext>
-            </a:extLst>
-          </p:cNvPr>
-          <p:cNvSpPr>
-            <a:spLocks noGrp="1"/>
-          </p:cNvSpPr>
-          <p:nvPr>
-            <p:ph type="ftr" sz="quarter" idx="3"/>
-          </p:nvPr>
-        </p:nvSpPr>
-        <p:spPr/>
-        <p:txBody>
-          <a:bodyPr/>
-          <a:lstStyle/>
-          <a:p>
-            <a:r>
-              <a:rPr lang="en-US"/>
-              <a:t>© 2021 Software AG. All rights reserved. For internal use only and for Software AG Partners.</a:t>
-            </a:r>
-            <a:endParaRPr lang="en-US" dirty="0"/>
-          </a:p>
-        </p:txBody>
-      </p:sp>
-      <p:sp>
-        <p:nvSpPr>
-          <p:cNvPr id="3" name="Slide Number Placeholder 2">
-            <a:extLst>
-              <a:ext uri="{FF2B5EF4-FFF2-40B4-BE49-F238E27FC236}">
-                <a16:creationId xmlns:a16="http://schemas.microsoft.com/office/drawing/2014/main" id="{7C63E64A-9F9B-478B-85FC-2B62EB076A62}"/>
-              </a:ext>
-            </a:extLst>
-          </p:cNvPr>
-          <p:cNvSpPr>
-            <a:spLocks noGrp="1"/>
-          </p:cNvSpPr>
-          <p:nvPr>
-            <p:ph type="sldNum" sz="quarter" idx="4"/>
-          </p:nvPr>
-        </p:nvSpPr>
-        <p:spPr/>
-        <p:txBody>
-          <a:bodyPr/>
-          <a:lstStyle/>
-          <a:p>
-            <a:fld id="{22FF84AA-2C76-4AF1-8502-73D25D47F37C}" type="slidenum">
-              <a:rPr lang="en-US"/>
-              <a:pPr/>
-              <a:t>9</a:t>
-            </a:fld>
-            <a:endParaRPr lang="en-US" dirty="0"/>
-          </a:p>
-        </p:txBody>
-      </p:sp>
-    </p:spTree>
-    <p:extLst>
-      <p:ext uri="{BB962C8B-B14F-4D97-AF65-F5344CB8AC3E}">
-        <p14:creationId xmlns:p14="http://schemas.microsoft.com/office/powerpoint/2010/main" val="1534332258"/>
       </p:ext>
     </p:extLst>
   </p:cSld>

</xml_diff>